<commit_message>
fixed typo and added 05
</commit_message>
<xml_diff>
--- a/Presentations/Presentations Power Point/05_Methods & blocks.pptx
+++ b/Presentations/Presentations Power Point/05_Methods & blocks.pptx
@@ -1,24 +1,24 @@
 
 <file path=ppt/presentation.xml><?xml version="1.0" encoding="utf-8"?>
-<p:presentation xmlns:a="http://schemas.openxmlformats.org/drawingml/2006/main" xmlns:r="http://schemas.openxmlformats.org/officeDocument/2006/relationships" xmlns:p="http://schemas.openxmlformats.org/presentationml/2006/main" xmlns:m="http://schemas.openxmlformats.org/officeDocument/2006/math" xmlns:a14="http://schemas.microsoft.com/office/drawing/2010/main">
+<p:presentation xmlns:a="http://schemas.openxmlformats.org/drawingml/2006/main" xmlns:r="http://schemas.openxmlformats.org/officeDocument/2006/relationships" xmlns:p="http://schemas.openxmlformats.org/presentationml/2006/main">
   <p:sldMasterIdLst>
-    <p:sldMasterId id="2147483648" r:id="rId5"/>
+    <p:sldMasterId id="2147483648" r:id="rId1"/>
   </p:sldMasterIdLst>
   <p:notesMasterIdLst>
-    <p:notesMasterId r:id="rId7"/>
+    <p:notesMasterId r:id="rId13"/>
   </p:notesMasterIdLst>
   <p:sldIdLst>
-    <p:sldId id="256" r:id="rId8"/>
-    <p:sldId id="257" r:id="rId9"/>
-    <p:sldId id="258" r:id="rId10"/>
-    <p:sldId id="259" r:id="rId11"/>
-    <p:sldId id="260" r:id="rId12"/>
-    <p:sldId id="261" r:id="rId13"/>
-    <p:sldId id="262" r:id="rId14"/>
-    <p:sldId id="263" r:id="rId15"/>
-    <p:sldId id="264" r:id="rId16"/>
-    <p:sldId id="265" r:id="rId17"/>
-    <p:sldId id="266" r:id="rId18"/>
+    <p:sldId id="256" r:id="rId2"/>
+    <p:sldId id="257" r:id="rId3"/>
+    <p:sldId id="258" r:id="rId4"/>
+    <p:sldId id="259" r:id="rId5"/>
+    <p:sldId id="260" r:id="rId6"/>
+    <p:sldId id="261" r:id="rId7"/>
+    <p:sldId id="262" r:id="rId8"/>
+    <p:sldId id="263" r:id="rId9"/>
+    <p:sldId id="264" r:id="rId10"/>
+    <p:sldId id="265" r:id="rId11"/>
+    <p:sldId id="266" r:id="rId12"/>
   </p:sldIdLst>
   <p:sldSz cx="13004800" cy="9753600"/>
   <p:notesSz cx="6858000" cy="9144000"/>
@@ -38,7 +38,7 @@
       <a:buFontTx/>
       <a:buNone/>
       <a:tabLst/>
-      <a:defRPr b="0" baseline="0" cap="none" i="0" spc="0" strike="noStrike" sz="1800" u="none" kumimoji="0" normalizeH="0">
+      <a:defRPr kumimoji="0" sz="1800" b="0" i="0" u="none" strike="noStrike" cap="none" spc="0" normalizeH="0" baseline="0">
         <a:ln>
           <a:noFill/>
         </a:ln>
@@ -64,7 +64,7 @@
       <a:buFontTx/>
       <a:buNone/>
       <a:tabLst/>
-      <a:defRPr b="0" baseline="0" cap="none" i="0" spc="0" strike="noStrike" sz="5800" u="none" kumimoji="0" normalizeH="0">
+      <a:defRPr kumimoji="0" sz="5800" b="0" i="0" u="none" strike="noStrike" cap="none" spc="0" normalizeH="0" baseline="0">
         <a:ln>
           <a:noFill/>
         </a:ln>
@@ -94,7 +94,7 @@
       <a:buFontTx/>
       <a:buNone/>
       <a:tabLst/>
-      <a:defRPr b="0" baseline="0" cap="none" i="0" spc="0" strike="noStrike" sz="5800" u="none" kumimoji="0" normalizeH="0">
+      <a:defRPr kumimoji="0" sz="5800" b="0" i="0" u="none" strike="noStrike" cap="none" spc="0" normalizeH="0" baseline="0">
         <a:ln>
           <a:noFill/>
         </a:ln>
@@ -124,7 +124,7 @@
       <a:buFontTx/>
       <a:buNone/>
       <a:tabLst/>
-      <a:defRPr b="0" baseline="0" cap="none" i="0" spc="0" strike="noStrike" sz="5800" u="none" kumimoji="0" normalizeH="0">
+      <a:defRPr kumimoji="0" sz="5800" b="0" i="0" u="none" strike="noStrike" cap="none" spc="0" normalizeH="0" baseline="0">
         <a:ln>
           <a:noFill/>
         </a:ln>
@@ -154,7 +154,7 @@
       <a:buFontTx/>
       <a:buNone/>
       <a:tabLst/>
-      <a:defRPr b="0" baseline="0" cap="none" i="0" spc="0" strike="noStrike" sz="5800" u="none" kumimoji="0" normalizeH="0">
+      <a:defRPr kumimoji="0" sz="5800" b="0" i="0" u="none" strike="noStrike" cap="none" spc="0" normalizeH="0" baseline="0">
         <a:ln>
           <a:noFill/>
         </a:ln>
@@ -184,7 +184,7 @@
       <a:buFontTx/>
       <a:buNone/>
       <a:tabLst/>
-      <a:defRPr b="0" baseline="0" cap="none" i="0" spc="0" strike="noStrike" sz="5800" u="none" kumimoji="0" normalizeH="0">
+      <a:defRPr kumimoji="0" sz="5800" b="0" i="0" u="none" strike="noStrike" cap="none" spc="0" normalizeH="0" baseline="0">
         <a:ln>
           <a:noFill/>
         </a:ln>
@@ -214,7 +214,7 @@
       <a:buFontTx/>
       <a:buNone/>
       <a:tabLst/>
-      <a:defRPr b="0" baseline="0" cap="none" i="0" spc="0" strike="noStrike" sz="5800" u="none" kumimoji="0" normalizeH="0">
+      <a:defRPr kumimoji="0" sz="5800" b="0" i="0" u="none" strike="noStrike" cap="none" spc="0" normalizeH="0" baseline="0">
         <a:ln>
           <a:noFill/>
         </a:ln>
@@ -244,7 +244,7 @@
       <a:buFontTx/>
       <a:buNone/>
       <a:tabLst/>
-      <a:defRPr b="0" baseline="0" cap="none" i="0" spc="0" strike="noStrike" sz="5800" u="none" kumimoji="0" normalizeH="0">
+      <a:defRPr kumimoji="0" sz="5800" b="0" i="0" u="none" strike="noStrike" cap="none" spc="0" normalizeH="0" baseline="0">
         <a:ln>
           <a:noFill/>
         </a:ln>
@@ -274,7 +274,7 @@
       <a:buFontTx/>
       <a:buNone/>
       <a:tabLst/>
-      <a:defRPr b="0" baseline="0" cap="none" i="0" spc="0" strike="noStrike" sz="5800" u="none" kumimoji="0" normalizeH="0">
+      <a:defRPr kumimoji="0" sz="5800" b="0" i="0" u="none" strike="noStrike" cap="none" spc="0" normalizeH="0" baseline="0">
         <a:ln>
           <a:noFill/>
         </a:ln>
@@ -304,7 +304,7 @@
       <a:buFontTx/>
       <a:buNone/>
       <a:tabLst/>
-      <a:defRPr b="0" baseline="0" cap="none" i="0" spc="0" strike="noStrike" sz="5800" u="none" kumimoji="0" normalizeH="0">
+      <a:defRPr kumimoji="0" sz="5800" b="0" i="0" u="none" strike="noStrike" cap="none" spc="0" normalizeH="0" baseline="0">
         <a:ln>
           <a:noFill/>
         </a:ln>
@@ -323,13 +323,14 @@
 </p:presentation>
 </file>
 
-<file path=ppt/commentAuthors.xml><?xml version="1.0" encoding="utf-8"?>
-<p:cmAuthorLst xmlns:a="http://schemas.openxmlformats.org/drawingml/2006/main" xmlns:r="http://schemas.openxmlformats.org/officeDocument/2006/relationships" xmlns:p="http://schemas.openxmlformats.org/presentationml/2006/main" xmlns:m="http://schemas.openxmlformats.org/officeDocument/2006/math" xmlns:a14="http://schemas.microsoft.com/office/drawing/2010/main"/>
-</file>
-
 <file path=ppt/notesMasters/notesMaster1.xml><?xml version="1.0" encoding="utf-8"?>
-<p:notesMaster xmlns:a="http://schemas.openxmlformats.org/drawingml/2006/main" xmlns:r="http://schemas.openxmlformats.org/officeDocument/2006/relationships" xmlns:p="http://schemas.openxmlformats.org/presentationml/2006/main" xmlns:m="http://schemas.openxmlformats.org/officeDocument/2006/math" xmlns:a14="http://schemas.microsoft.com/office/drawing/2010/main">
+<p:notesMaster xmlns:a="http://schemas.openxmlformats.org/drawingml/2006/main" xmlns:r="http://schemas.openxmlformats.org/officeDocument/2006/relationships" xmlns:p="http://schemas.openxmlformats.org/presentationml/2006/main">
   <p:cSld>
+    <p:bg>
+      <p:bgRef idx="1001">
+        <a:schemeClr val="bg1"/>
+      </p:bgRef>
+    </p:bg>
     <p:spTree>
       <p:nvGrpSpPr>
         <p:cNvPr id="1" name=""/>
@@ -347,7 +348,9 @@
       <p:sp>
         <p:nvSpPr>
           <p:cNvPr id="116" name="Shape 116"/>
-          <p:cNvSpPr/>
+          <p:cNvSpPr>
+            <a:spLocks noGrp="1" noRot="1" noChangeAspect="1"/>
+          </p:cNvSpPr>
           <p:nvPr>
             <p:ph type="sldImg"/>
           </p:nvPr>
@@ -365,14 +368,16 @@
           <a:bodyPr/>
           <a:lstStyle/>
           <a:p>
-            <a:pPr/>
+            <a:endParaRPr/>
           </a:p>
         </p:txBody>
       </p:sp>
       <p:sp>
         <p:nvSpPr>
           <p:cNvPr id="117" name="Shape 117"/>
-          <p:cNvSpPr/>
+          <p:cNvSpPr>
+            <a:spLocks noGrp="1"/>
+          </p:cNvSpPr>
           <p:nvPr>
             <p:ph type="body" sz="quarter" idx="1"/>
           </p:nvPr>
@@ -390,7 +395,7 @@
           <a:bodyPr/>
           <a:lstStyle/>
           <a:p>
-            <a:pPr/>
+            <a:endParaRPr/>
           </a:p>
         </p:txBody>
       </p:sp>
@@ -502,7 +507,7 @@
 </file>
 
 <file path=ppt/slideLayouts/slideLayout1.xml><?xml version="1.0" encoding="utf-8"?>
-<p:sldLayout xmlns:a="http://schemas.openxmlformats.org/drawingml/2006/main" xmlns:r="http://schemas.openxmlformats.org/officeDocument/2006/relationships" xmlns:p="http://schemas.openxmlformats.org/presentationml/2006/main" xmlns:m="http://schemas.openxmlformats.org/officeDocument/2006/math" xmlns:a14="http://schemas.microsoft.com/office/drawing/2010/main" type="title" showMasterSp="1" showMasterPhAnim="1">
+<p:sldLayout xmlns:a="http://schemas.openxmlformats.org/drawingml/2006/main" xmlns:r="http://schemas.openxmlformats.org/officeDocument/2006/relationships" xmlns:p="http://schemas.openxmlformats.org/presentationml/2006/main" type="title">
   <p:cSld name="Titre et sous-titre">
     <p:spTree>
       <p:nvGrpSpPr>
@@ -521,7 +526,9 @@
       <p:sp>
         <p:nvSpPr>
           <p:cNvPr id="11" name="Title Text"/>
-          <p:cNvSpPr txBox="1"/>
+          <p:cNvSpPr txBox="1">
+            <a:spLocks noGrp="1"/>
+          </p:cNvSpPr>
           <p:nvPr>
             <p:ph type="title"/>
           </p:nvPr>
@@ -535,7 +542,6 @@
           <a:bodyPr/>
           <a:lstStyle/>
           <a:p>
-            <a:pPr/>
             <a:r>
               <a:t>Title Text</a:t>
             </a:r>
@@ -545,7 +551,9 @@
       <p:sp>
         <p:nvSpPr>
           <p:cNvPr id="12" name="Body Level One…"/>
-          <p:cNvSpPr txBox="1"/>
+          <p:cNvSpPr txBox="1">
+            <a:spLocks noGrp="1"/>
+          </p:cNvSpPr>
           <p:nvPr>
             <p:ph type="body" sz="quarter" idx="1"/>
           </p:nvPr>
@@ -559,7 +567,6 @@
           <a:bodyPr/>
           <a:lstStyle/>
           <a:p>
-            <a:pPr/>
             <a:r>
               <a:t>Body Level One</a:t>
             </a:r>
@@ -593,7 +600,9 @@
       <p:sp>
         <p:nvSpPr>
           <p:cNvPr id="13" name="Slide Number"/>
-          <p:cNvSpPr txBox="1"/>
+          <p:cNvSpPr txBox="1">
+            <a:spLocks noGrp="1"/>
+          </p:cNvSpPr>
           <p:nvPr>
             <p:ph type="sldNum" sz="quarter" idx="2"/>
           </p:nvPr>
@@ -607,8 +616,10 @@
           <a:bodyPr/>
           <a:lstStyle/>
           <a:p>
-            <a:pPr/>
-            <a:fld id="{86CB4B4D-7CA3-9044-876B-883B54F8677D}" type="slidenum"/>
+            <a:fld id="{86CB4B4D-7CA3-9044-876B-883B54F8677D}" type="slidenum">
+              <a:t>‹#›</a:t>
+            </a:fld>
+            <a:endParaRPr/>
           </a:p>
         </p:txBody>
       </p:sp>
@@ -617,12 +628,12 @@
   <p:clrMapOvr>
     <a:masterClrMapping/>
   </p:clrMapOvr>
-  <p:transition xmlns:p14="http://schemas.microsoft.com/office/powerpoint/2010/main" spd="med" advClick="1"/>
+  <p:transition spd="med"/>
 </p:sldLayout>
 </file>
 
 <file path=ppt/slideLayouts/slideLayout10.xml><?xml version="1.0" encoding="utf-8"?>
-<p:sldLayout xmlns:a="http://schemas.openxmlformats.org/drawingml/2006/main" xmlns:r="http://schemas.openxmlformats.org/officeDocument/2006/relationships" xmlns:p="http://schemas.openxmlformats.org/presentationml/2006/main" xmlns:m="http://schemas.openxmlformats.org/officeDocument/2006/math" xmlns:a14="http://schemas.microsoft.com/office/drawing/2010/main" type="tx" showMasterSp="1" showMasterPhAnim="1">
+<p:sldLayout xmlns:a="http://schemas.openxmlformats.org/drawingml/2006/main" xmlns:r="http://schemas.openxmlformats.org/officeDocument/2006/relationships" xmlns:p="http://schemas.openxmlformats.org/presentationml/2006/main" type="tx">
   <p:cSld name="Citation">
     <p:spTree>
       <p:nvGrpSpPr>
@@ -641,7 +652,9 @@
       <p:sp>
         <p:nvSpPr>
           <p:cNvPr id="93" name="-Gilles Allain"/>
-          <p:cNvSpPr/>
+          <p:cNvSpPr>
+            <a:spLocks noGrp="1"/>
+          </p:cNvSpPr>
           <p:nvPr>
             <p:ph type="body" sz="quarter" idx="13"/>
           </p:nvPr>
@@ -670,7 +683,6 @@
             </a:lvl1pPr>
           </a:lstStyle>
           <a:p>
-            <a:pPr/>
             <a:r>
               <a:t>-Gilles Allain</a:t>
             </a:r>
@@ -680,7 +692,9 @@
       <p:sp>
         <p:nvSpPr>
           <p:cNvPr id="94" name="« Saisissez une citation ici. »"/>
-          <p:cNvSpPr/>
+          <p:cNvSpPr>
+            <a:spLocks noGrp="1"/>
+          </p:cNvSpPr>
           <p:nvPr>
             <p:ph type="body" sz="quarter" idx="14"/>
           </p:nvPr>
@@ -704,7 +718,6 @@
             </a:lvl1pPr>
           </a:lstStyle>
           <a:p>
-            <a:pPr/>
             <a:r>
               <a:t>« Saisissez une citation ici. » </a:t>
             </a:r>
@@ -714,7 +727,9 @@
       <p:sp>
         <p:nvSpPr>
           <p:cNvPr id="95" name="Slide Number"/>
-          <p:cNvSpPr txBox="1"/>
+          <p:cNvSpPr txBox="1">
+            <a:spLocks noGrp="1"/>
+          </p:cNvSpPr>
           <p:nvPr>
             <p:ph type="sldNum" sz="quarter" idx="2"/>
           </p:nvPr>
@@ -728,8 +743,10 @@
           <a:bodyPr/>
           <a:lstStyle/>
           <a:p>
-            <a:pPr/>
-            <a:fld id="{86CB4B4D-7CA3-9044-876B-883B54F8677D}" type="slidenum"/>
+            <a:fld id="{86CB4B4D-7CA3-9044-876B-883B54F8677D}" type="slidenum">
+              <a:t>‹#›</a:t>
+            </a:fld>
+            <a:endParaRPr/>
           </a:p>
         </p:txBody>
       </p:sp>
@@ -738,12 +755,12 @@
   <p:clrMapOvr>
     <a:masterClrMapping/>
   </p:clrMapOvr>
-  <p:transition xmlns:p14="http://schemas.microsoft.com/office/powerpoint/2010/main" spd="med" advClick="1"/>
+  <p:transition spd="med"/>
 </p:sldLayout>
 </file>
 
 <file path=ppt/slideLayouts/slideLayout11.xml><?xml version="1.0" encoding="utf-8"?>
-<p:sldLayout xmlns:a="http://schemas.openxmlformats.org/drawingml/2006/main" xmlns:r="http://schemas.openxmlformats.org/officeDocument/2006/relationships" xmlns:p="http://schemas.openxmlformats.org/presentationml/2006/main" xmlns:m="http://schemas.openxmlformats.org/officeDocument/2006/math" xmlns:a14="http://schemas.microsoft.com/office/drawing/2010/main" type="tx" showMasterSp="1" showMasterPhAnim="1">
+<p:sldLayout xmlns:a="http://schemas.openxmlformats.org/drawingml/2006/main" xmlns:r="http://schemas.openxmlformats.org/officeDocument/2006/relationships" xmlns:p="http://schemas.openxmlformats.org/presentationml/2006/main" type="tx">
   <p:cSld name="Photo">
     <p:spTree>
       <p:nvGrpSpPr>
@@ -762,7 +779,9 @@
       <p:sp>
         <p:nvSpPr>
           <p:cNvPr id="102" name="Image"/>
-          <p:cNvSpPr/>
+          <p:cNvSpPr>
+            <a:spLocks noGrp="1"/>
+          </p:cNvSpPr>
           <p:nvPr>
             <p:ph type="pic" idx="13"/>
           </p:nvPr>
@@ -782,14 +801,16 @@
           </a:bodyPr>
           <a:lstStyle/>
           <a:p>
-            <a:pPr/>
+            <a:endParaRPr/>
           </a:p>
         </p:txBody>
       </p:sp>
       <p:sp>
         <p:nvSpPr>
           <p:cNvPr id="103" name="Slide Number"/>
-          <p:cNvSpPr txBox="1"/>
+          <p:cNvSpPr txBox="1">
+            <a:spLocks noGrp="1"/>
+          </p:cNvSpPr>
           <p:nvPr>
             <p:ph type="sldNum" sz="quarter" idx="2"/>
           </p:nvPr>
@@ -803,8 +824,10 @@
           <a:bodyPr/>
           <a:lstStyle/>
           <a:p>
-            <a:pPr/>
-            <a:fld id="{86CB4B4D-7CA3-9044-876B-883B54F8677D}" type="slidenum"/>
+            <a:fld id="{86CB4B4D-7CA3-9044-876B-883B54F8677D}" type="slidenum">
+              <a:t>‹#›</a:t>
+            </a:fld>
+            <a:endParaRPr/>
           </a:p>
         </p:txBody>
       </p:sp>
@@ -813,12 +836,12 @@
   <p:clrMapOvr>
     <a:masterClrMapping/>
   </p:clrMapOvr>
-  <p:transition xmlns:p14="http://schemas.microsoft.com/office/powerpoint/2010/main" spd="med" advClick="1"/>
+  <p:transition spd="med"/>
 </p:sldLayout>
 </file>
 
 <file path=ppt/slideLayouts/slideLayout12.xml><?xml version="1.0" encoding="utf-8"?>
-<p:sldLayout xmlns:a="http://schemas.openxmlformats.org/drawingml/2006/main" xmlns:r="http://schemas.openxmlformats.org/officeDocument/2006/relationships" xmlns:p="http://schemas.openxmlformats.org/presentationml/2006/main" xmlns:m="http://schemas.openxmlformats.org/officeDocument/2006/math" xmlns:a14="http://schemas.microsoft.com/office/drawing/2010/main" type="tx" showMasterSp="1" showMasterPhAnim="1">
+<p:sldLayout xmlns:a="http://schemas.openxmlformats.org/drawingml/2006/main" xmlns:r="http://schemas.openxmlformats.org/officeDocument/2006/relationships" xmlns:p="http://schemas.openxmlformats.org/presentationml/2006/main" type="tx">
   <p:cSld name="Vierge">
     <p:spTree>
       <p:nvGrpSpPr>
@@ -837,7 +860,9 @@
       <p:sp>
         <p:nvSpPr>
           <p:cNvPr id="110" name="Slide Number"/>
-          <p:cNvSpPr txBox="1"/>
+          <p:cNvSpPr txBox="1">
+            <a:spLocks noGrp="1"/>
+          </p:cNvSpPr>
           <p:nvPr>
             <p:ph type="sldNum" sz="quarter" idx="2"/>
           </p:nvPr>
@@ -851,8 +876,10 @@
           <a:bodyPr/>
           <a:lstStyle/>
           <a:p>
-            <a:pPr/>
-            <a:fld id="{86CB4B4D-7CA3-9044-876B-883B54F8677D}" type="slidenum"/>
+            <a:fld id="{86CB4B4D-7CA3-9044-876B-883B54F8677D}" type="slidenum">
+              <a:t>‹#›</a:t>
+            </a:fld>
+            <a:endParaRPr/>
           </a:p>
         </p:txBody>
       </p:sp>
@@ -861,12 +888,12 @@
   <p:clrMapOvr>
     <a:masterClrMapping/>
   </p:clrMapOvr>
-  <p:transition xmlns:p14="http://schemas.microsoft.com/office/powerpoint/2010/main" spd="med" advClick="1"/>
+  <p:transition spd="med"/>
 </p:sldLayout>
 </file>
 
 <file path=ppt/slideLayouts/slideLayout2.xml><?xml version="1.0" encoding="utf-8"?>
-<p:sldLayout xmlns:a="http://schemas.openxmlformats.org/drawingml/2006/main" xmlns:r="http://schemas.openxmlformats.org/officeDocument/2006/relationships" xmlns:p="http://schemas.openxmlformats.org/presentationml/2006/main" xmlns:m="http://schemas.openxmlformats.org/officeDocument/2006/math" xmlns:a14="http://schemas.microsoft.com/office/drawing/2010/main" type="tx" showMasterSp="1" showMasterPhAnim="1">
+<p:sldLayout xmlns:a="http://schemas.openxmlformats.org/drawingml/2006/main" xmlns:r="http://schemas.openxmlformats.org/officeDocument/2006/relationships" xmlns:p="http://schemas.openxmlformats.org/presentationml/2006/main" type="tx">
   <p:cSld name="Photo - Horizontale">
     <p:spTree>
       <p:nvGrpSpPr>
@@ -885,7 +912,9 @@
       <p:sp>
         <p:nvSpPr>
           <p:cNvPr id="20" name="Image"/>
-          <p:cNvSpPr/>
+          <p:cNvSpPr>
+            <a:spLocks noGrp="1"/>
+          </p:cNvSpPr>
           <p:nvPr>
             <p:ph type="pic" sz="half" idx="13"/>
           </p:nvPr>
@@ -905,14 +934,16 @@
           </a:bodyPr>
           <a:lstStyle/>
           <a:p>
-            <a:pPr/>
+            <a:endParaRPr/>
           </a:p>
         </p:txBody>
       </p:sp>
       <p:sp>
         <p:nvSpPr>
           <p:cNvPr id="21" name="Title Text"/>
-          <p:cNvSpPr txBox="1"/>
+          <p:cNvSpPr txBox="1">
+            <a:spLocks noGrp="1"/>
+          </p:cNvSpPr>
           <p:nvPr>
             <p:ph type="title"/>
           </p:nvPr>
@@ -930,7 +961,6 @@
           <a:bodyPr/>
           <a:lstStyle/>
           <a:p>
-            <a:pPr/>
             <a:r>
               <a:t>Title Text</a:t>
             </a:r>
@@ -940,7 +970,9 @@
       <p:sp>
         <p:nvSpPr>
           <p:cNvPr id="22" name="Body Level One…"/>
-          <p:cNvSpPr txBox="1"/>
+          <p:cNvSpPr txBox="1">
+            <a:spLocks noGrp="1"/>
+          </p:cNvSpPr>
           <p:nvPr>
             <p:ph type="body" sz="quarter" idx="1"/>
           </p:nvPr>
@@ -958,7 +990,6 @@
           <a:bodyPr/>
           <a:lstStyle/>
           <a:p>
-            <a:pPr/>
             <a:r>
               <a:t>Body Level One</a:t>
             </a:r>
@@ -992,7 +1023,9 @@
       <p:sp>
         <p:nvSpPr>
           <p:cNvPr id="23" name="Slide Number"/>
-          <p:cNvSpPr txBox="1"/>
+          <p:cNvSpPr txBox="1">
+            <a:spLocks noGrp="1"/>
+          </p:cNvSpPr>
           <p:nvPr>
             <p:ph type="sldNum" sz="quarter" idx="2"/>
           </p:nvPr>
@@ -1010,8 +1043,10 @@
           <a:bodyPr/>
           <a:lstStyle/>
           <a:p>
-            <a:pPr/>
-            <a:fld id="{86CB4B4D-7CA3-9044-876B-883B54F8677D}" type="slidenum"/>
+            <a:fld id="{86CB4B4D-7CA3-9044-876B-883B54F8677D}" type="slidenum">
+              <a:t>‹#›</a:t>
+            </a:fld>
+            <a:endParaRPr/>
           </a:p>
         </p:txBody>
       </p:sp>
@@ -1020,12 +1055,12 @@
   <p:clrMapOvr>
     <a:masterClrMapping/>
   </p:clrMapOvr>
-  <p:transition xmlns:p14="http://schemas.microsoft.com/office/powerpoint/2010/main" spd="med" advClick="1"/>
+  <p:transition spd="med"/>
 </p:sldLayout>
 </file>
 
 <file path=ppt/slideLayouts/slideLayout3.xml><?xml version="1.0" encoding="utf-8"?>
-<p:sldLayout xmlns:a="http://schemas.openxmlformats.org/drawingml/2006/main" xmlns:r="http://schemas.openxmlformats.org/officeDocument/2006/relationships" xmlns:p="http://schemas.openxmlformats.org/presentationml/2006/main" xmlns:m="http://schemas.openxmlformats.org/officeDocument/2006/math" xmlns:a14="http://schemas.microsoft.com/office/drawing/2010/main" type="tx" showMasterSp="1" showMasterPhAnim="1">
+<p:sldLayout xmlns:a="http://schemas.openxmlformats.org/drawingml/2006/main" xmlns:r="http://schemas.openxmlformats.org/officeDocument/2006/relationships" xmlns:p="http://schemas.openxmlformats.org/presentationml/2006/main" type="tx">
   <p:cSld name="Titre - Centré">
     <p:spTree>
       <p:nvGrpSpPr>
@@ -1044,7 +1079,9 @@
       <p:sp>
         <p:nvSpPr>
           <p:cNvPr id="30" name="Title Text"/>
-          <p:cNvSpPr txBox="1"/>
+          <p:cNvSpPr txBox="1">
+            <a:spLocks noGrp="1"/>
+          </p:cNvSpPr>
           <p:nvPr>
             <p:ph type="title"/>
           </p:nvPr>
@@ -1062,7 +1099,6 @@
           <a:bodyPr anchor="ctr"/>
           <a:lstStyle/>
           <a:p>
-            <a:pPr/>
             <a:r>
               <a:t>Title Text</a:t>
             </a:r>
@@ -1072,7 +1108,9 @@
       <p:sp>
         <p:nvSpPr>
           <p:cNvPr id="31" name="Slide Number"/>
-          <p:cNvSpPr txBox="1"/>
+          <p:cNvSpPr txBox="1">
+            <a:spLocks noGrp="1"/>
+          </p:cNvSpPr>
           <p:nvPr>
             <p:ph type="sldNum" sz="quarter" idx="2"/>
           </p:nvPr>
@@ -1086,8 +1124,10 @@
           <a:bodyPr/>
           <a:lstStyle/>
           <a:p>
-            <a:pPr/>
-            <a:fld id="{86CB4B4D-7CA3-9044-876B-883B54F8677D}" type="slidenum"/>
+            <a:fld id="{86CB4B4D-7CA3-9044-876B-883B54F8677D}" type="slidenum">
+              <a:t>‹#›</a:t>
+            </a:fld>
+            <a:endParaRPr/>
           </a:p>
         </p:txBody>
       </p:sp>
@@ -1096,12 +1136,12 @@
   <p:clrMapOvr>
     <a:masterClrMapping/>
   </p:clrMapOvr>
-  <p:transition xmlns:p14="http://schemas.microsoft.com/office/powerpoint/2010/main" spd="med" advClick="1"/>
+  <p:transition spd="med"/>
 </p:sldLayout>
 </file>
 
 <file path=ppt/slideLayouts/slideLayout4.xml><?xml version="1.0" encoding="utf-8"?>
-<p:sldLayout xmlns:a="http://schemas.openxmlformats.org/drawingml/2006/main" xmlns:r="http://schemas.openxmlformats.org/officeDocument/2006/relationships" xmlns:p="http://schemas.openxmlformats.org/presentationml/2006/main" xmlns:m="http://schemas.openxmlformats.org/officeDocument/2006/math" xmlns:a14="http://schemas.microsoft.com/office/drawing/2010/main" type="tx" showMasterSp="1" showMasterPhAnim="1">
+<p:sldLayout xmlns:a="http://schemas.openxmlformats.org/drawingml/2006/main" xmlns:r="http://schemas.openxmlformats.org/officeDocument/2006/relationships" xmlns:p="http://schemas.openxmlformats.org/presentationml/2006/main" type="tx">
   <p:cSld name="Photo - Verticale">
     <p:spTree>
       <p:nvGrpSpPr>
@@ -1120,7 +1160,9 @@
       <p:sp>
         <p:nvSpPr>
           <p:cNvPr id="38" name="Image"/>
-          <p:cNvSpPr/>
+          <p:cNvSpPr>
+            <a:spLocks noGrp="1"/>
+          </p:cNvSpPr>
           <p:nvPr>
             <p:ph type="pic" idx="13"/>
           </p:nvPr>
@@ -1140,14 +1182,16 @@
           </a:bodyPr>
           <a:lstStyle/>
           <a:p>
-            <a:pPr/>
+            <a:endParaRPr/>
           </a:p>
         </p:txBody>
       </p:sp>
       <p:sp>
         <p:nvSpPr>
           <p:cNvPr id="39" name="Title Text"/>
-          <p:cNvSpPr txBox="1"/>
+          <p:cNvSpPr txBox="1">
+            <a:spLocks noGrp="1"/>
+          </p:cNvSpPr>
           <p:nvPr>
             <p:ph type="title"/>
           </p:nvPr>
@@ -1169,7 +1213,6 @@
             </a:lvl1pPr>
           </a:lstStyle>
           <a:p>
-            <a:pPr/>
             <a:r>
               <a:t>Title Text</a:t>
             </a:r>
@@ -1179,7 +1222,9 @@
       <p:sp>
         <p:nvSpPr>
           <p:cNvPr id="40" name="Body Level One…"/>
-          <p:cNvSpPr txBox="1"/>
+          <p:cNvSpPr txBox="1">
+            <a:spLocks noGrp="1"/>
+          </p:cNvSpPr>
           <p:nvPr>
             <p:ph type="body" sz="quarter" idx="1"/>
           </p:nvPr>
@@ -1197,7 +1242,6 @@
           <a:bodyPr/>
           <a:lstStyle/>
           <a:p>
-            <a:pPr/>
             <a:r>
               <a:t>Body Level One</a:t>
             </a:r>
@@ -1231,7 +1275,9 @@
       <p:sp>
         <p:nvSpPr>
           <p:cNvPr id="41" name="Slide Number"/>
-          <p:cNvSpPr txBox="1"/>
+          <p:cNvSpPr txBox="1">
+            <a:spLocks noGrp="1"/>
+          </p:cNvSpPr>
           <p:nvPr>
             <p:ph type="sldNum" sz="quarter" idx="2"/>
           </p:nvPr>
@@ -1245,8 +1291,10 @@
           <a:bodyPr/>
           <a:lstStyle/>
           <a:p>
-            <a:pPr/>
-            <a:fld id="{86CB4B4D-7CA3-9044-876B-883B54F8677D}" type="slidenum"/>
+            <a:fld id="{86CB4B4D-7CA3-9044-876B-883B54F8677D}" type="slidenum">
+              <a:t>‹#›</a:t>
+            </a:fld>
+            <a:endParaRPr/>
           </a:p>
         </p:txBody>
       </p:sp>
@@ -1255,12 +1303,12 @@
   <p:clrMapOvr>
     <a:masterClrMapping/>
   </p:clrMapOvr>
-  <p:transition xmlns:p14="http://schemas.microsoft.com/office/powerpoint/2010/main" spd="med" advClick="1"/>
+  <p:transition spd="med"/>
 </p:sldLayout>
 </file>
 
 <file path=ppt/slideLayouts/slideLayout5.xml><?xml version="1.0" encoding="utf-8"?>
-<p:sldLayout xmlns:a="http://schemas.openxmlformats.org/drawingml/2006/main" xmlns:r="http://schemas.openxmlformats.org/officeDocument/2006/relationships" xmlns:p="http://schemas.openxmlformats.org/presentationml/2006/main" xmlns:m="http://schemas.openxmlformats.org/officeDocument/2006/math" xmlns:a14="http://schemas.microsoft.com/office/drawing/2010/main" type="tx" showMasterSp="1" showMasterPhAnim="1">
+<p:sldLayout xmlns:a="http://schemas.openxmlformats.org/drawingml/2006/main" xmlns:r="http://schemas.openxmlformats.org/officeDocument/2006/relationships" xmlns:p="http://schemas.openxmlformats.org/presentationml/2006/main" type="tx">
   <p:cSld name="Titre - Haut">
     <p:spTree>
       <p:nvGrpSpPr>
@@ -1279,7 +1327,9 @@
       <p:sp>
         <p:nvSpPr>
           <p:cNvPr id="48" name="Title Text"/>
-          <p:cNvSpPr txBox="1"/>
+          <p:cNvSpPr txBox="1">
+            <a:spLocks noGrp="1"/>
+          </p:cNvSpPr>
           <p:nvPr>
             <p:ph type="title"/>
           </p:nvPr>
@@ -1297,7 +1347,6 @@
           <a:bodyPr anchor="ctr"/>
           <a:lstStyle/>
           <a:p>
-            <a:pPr/>
             <a:r>
               <a:t>Title Text</a:t>
             </a:r>
@@ -1307,7 +1356,9 @@
       <p:sp>
         <p:nvSpPr>
           <p:cNvPr id="49" name="Slide Number"/>
-          <p:cNvSpPr txBox="1"/>
+          <p:cNvSpPr txBox="1">
+            <a:spLocks noGrp="1"/>
+          </p:cNvSpPr>
           <p:nvPr>
             <p:ph type="sldNum" sz="quarter" idx="2"/>
           </p:nvPr>
@@ -1321,8 +1372,10 @@
           <a:bodyPr/>
           <a:lstStyle/>
           <a:p>
-            <a:pPr/>
-            <a:fld id="{86CB4B4D-7CA3-9044-876B-883B54F8677D}" type="slidenum"/>
+            <a:fld id="{86CB4B4D-7CA3-9044-876B-883B54F8677D}" type="slidenum">
+              <a:t>‹#›</a:t>
+            </a:fld>
+            <a:endParaRPr/>
           </a:p>
         </p:txBody>
       </p:sp>
@@ -1331,12 +1384,12 @@
   <p:clrMapOvr>
     <a:masterClrMapping/>
   </p:clrMapOvr>
-  <p:transition xmlns:p14="http://schemas.microsoft.com/office/powerpoint/2010/main" spd="med" advClick="1"/>
+  <p:transition spd="med"/>
 </p:sldLayout>
 </file>
 
 <file path=ppt/slideLayouts/slideLayout6.xml><?xml version="1.0" encoding="utf-8"?>
-<p:sldLayout xmlns:a="http://schemas.openxmlformats.org/drawingml/2006/main" xmlns:r="http://schemas.openxmlformats.org/officeDocument/2006/relationships" xmlns:p="http://schemas.openxmlformats.org/presentationml/2006/main" xmlns:m="http://schemas.openxmlformats.org/officeDocument/2006/math" xmlns:a14="http://schemas.microsoft.com/office/drawing/2010/main" type="tx" showMasterSp="1" showMasterPhAnim="1">
+<p:sldLayout xmlns:a="http://schemas.openxmlformats.org/drawingml/2006/main" xmlns:r="http://schemas.openxmlformats.org/officeDocument/2006/relationships" xmlns:p="http://schemas.openxmlformats.org/presentationml/2006/main" type="tx">
   <p:cSld name="Titre et puces">
     <p:spTree>
       <p:nvGrpSpPr>
@@ -1355,7 +1408,9 @@
       <p:sp>
         <p:nvSpPr>
           <p:cNvPr id="56" name="Title Text"/>
-          <p:cNvSpPr txBox="1"/>
+          <p:cNvSpPr txBox="1">
+            <a:spLocks noGrp="1"/>
+          </p:cNvSpPr>
           <p:nvPr>
             <p:ph type="title"/>
           </p:nvPr>
@@ -1373,7 +1428,6 @@
           <a:bodyPr anchor="ctr"/>
           <a:lstStyle/>
           <a:p>
-            <a:pPr/>
             <a:r>
               <a:t>Title Text</a:t>
             </a:r>
@@ -1383,7 +1437,9 @@
       <p:sp>
         <p:nvSpPr>
           <p:cNvPr id="57" name="Body Level One…"/>
-          <p:cNvSpPr txBox="1"/>
+          <p:cNvSpPr txBox="1">
+            <a:spLocks noGrp="1"/>
+          </p:cNvSpPr>
           <p:nvPr>
             <p:ph type="body" sz="half" idx="1"/>
           </p:nvPr>
@@ -1442,7 +1498,6 @@
             </a:lvl5pPr>
           </a:lstStyle>
           <a:p>
-            <a:pPr/>
             <a:r>
               <a:t>Body Level One</a:t>
             </a:r>
@@ -1476,7 +1531,9 @@
       <p:sp>
         <p:nvSpPr>
           <p:cNvPr id="58" name="Slide Number"/>
-          <p:cNvSpPr txBox="1"/>
+          <p:cNvSpPr txBox="1">
+            <a:spLocks noGrp="1"/>
+          </p:cNvSpPr>
           <p:nvPr>
             <p:ph type="sldNum" sz="quarter" idx="2"/>
           </p:nvPr>
@@ -1490,8 +1547,10 @@
           <a:bodyPr/>
           <a:lstStyle/>
           <a:p>
-            <a:pPr/>
-            <a:fld id="{86CB4B4D-7CA3-9044-876B-883B54F8677D}" type="slidenum"/>
+            <a:fld id="{86CB4B4D-7CA3-9044-876B-883B54F8677D}" type="slidenum">
+              <a:t>‹#›</a:t>
+            </a:fld>
+            <a:endParaRPr/>
           </a:p>
         </p:txBody>
       </p:sp>
@@ -1500,12 +1559,12 @@
   <p:clrMapOvr>
     <a:masterClrMapping/>
   </p:clrMapOvr>
-  <p:transition xmlns:p14="http://schemas.microsoft.com/office/powerpoint/2010/main" spd="med" advClick="1"/>
+  <p:transition spd="med"/>
 </p:sldLayout>
 </file>
 
 <file path=ppt/slideLayouts/slideLayout7.xml><?xml version="1.0" encoding="utf-8"?>
-<p:sldLayout xmlns:a="http://schemas.openxmlformats.org/drawingml/2006/main" xmlns:r="http://schemas.openxmlformats.org/officeDocument/2006/relationships" xmlns:p="http://schemas.openxmlformats.org/presentationml/2006/main" xmlns:m="http://schemas.openxmlformats.org/officeDocument/2006/math" xmlns:a14="http://schemas.microsoft.com/office/drawing/2010/main" type="tx" showMasterSp="1" showMasterPhAnim="1">
+<p:sldLayout xmlns:a="http://schemas.openxmlformats.org/drawingml/2006/main" xmlns:r="http://schemas.openxmlformats.org/officeDocument/2006/relationships" xmlns:p="http://schemas.openxmlformats.org/presentationml/2006/main" type="tx">
   <p:cSld name="Titre, puces et photo">
     <p:spTree>
       <p:nvGrpSpPr>
@@ -1524,7 +1583,9 @@
       <p:sp>
         <p:nvSpPr>
           <p:cNvPr id="65" name="Image"/>
-          <p:cNvSpPr/>
+          <p:cNvSpPr>
+            <a:spLocks noGrp="1"/>
+          </p:cNvSpPr>
           <p:nvPr>
             <p:ph type="pic" sz="half" idx="13"/>
           </p:nvPr>
@@ -1544,14 +1605,16 @@
           </a:bodyPr>
           <a:lstStyle/>
           <a:p>
-            <a:pPr/>
+            <a:endParaRPr/>
           </a:p>
         </p:txBody>
       </p:sp>
       <p:sp>
         <p:nvSpPr>
           <p:cNvPr id="66" name="Title Text"/>
-          <p:cNvSpPr txBox="1"/>
+          <p:cNvSpPr txBox="1">
+            <a:spLocks noGrp="1"/>
+          </p:cNvSpPr>
           <p:nvPr>
             <p:ph type="title"/>
           </p:nvPr>
@@ -1569,7 +1632,6 @@
           <a:bodyPr anchor="ctr"/>
           <a:lstStyle/>
           <a:p>
-            <a:pPr/>
             <a:r>
               <a:t>Title Text</a:t>
             </a:r>
@@ -1579,7 +1641,9 @@
       <p:sp>
         <p:nvSpPr>
           <p:cNvPr id="67" name="Body Level One…"/>
-          <p:cNvSpPr txBox="1"/>
+          <p:cNvSpPr txBox="1">
+            <a:spLocks noGrp="1"/>
+          </p:cNvSpPr>
           <p:nvPr>
             <p:ph type="body" sz="quarter" idx="1"/>
           </p:nvPr>
@@ -1638,7 +1702,6 @@
             </a:lvl5pPr>
           </a:lstStyle>
           <a:p>
-            <a:pPr/>
             <a:r>
               <a:t>Body Level One</a:t>
             </a:r>
@@ -1672,7 +1735,9 @@
       <p:sp>
         <p:nvSpPr>
           <p:cNvPr id="68" name="Slide Number"/>
-          <p:cNvSpPr txBox="1"/>
+          <p:cNvSpPr txBox="1">
+            <a:spLocks noGrp="1"/>
+          </p:cNvSpPr>
           <p:nvPr>
             <p:ph type="sldNum" sz="quarter" idx="2"/>
           </p:nvPr>
@@ -1686,8 +1751,10 @@
           <a:bodyPr/>
           <a:lstStyle/>
           <a:p>
-            <a:pPr/>
-            <a:fld id="{86CB4B4D-7CA3-9044-876B-883B54F8677D}" type="slidenum"/>
+            <a:fld id="{86CB4B4D-7CA3-9044-876B-883B54F8677D}" type="slidenum">
+              <a:t>‹#›</a:t>
+            </a:fld>
+            <a:endParaRPr/>
           </a:p>
         </p:txBody>
       </p:sp>
@@ -1696,12 +1763,12 @@
   <p:clrMapOvr>
     <a:masterClrMapping/>
   </p:clrMapOvr>
-  <p:transition xmlns:p14="http://schemas.microsoft.com/office/powerpoint/2010/main" spd="med" advClick="1"/>
+  <p:transition spd="med"/>
 </p:sldLayout>
 </file>
 
 <file path=ppt/slideLayouts/slideLayout8.xml><?xml version="1.0" encoding="utf-8"?>
-<p:sldLayout xmlns:a="http://schemas.openxmlformats.org/drawingml/2006/main" xmlns:r="http://schemas.openxmlformats.org/officeDocument/2006/relationships" xmlns:p="http://schemas.openxmlformats.org/presentationml/2006/main" xmlns:m="http://schemas.openxmlformats.org/officeDocument/2006/math" xmlns:a14="http://schemas.microsoft.com/office/drawing/2010/main" type="tx" showMasterSp="1" showMasterPhAnim="1">
+<p:sldLayout xmlns:a="http://schemas.openxmlformats.org/drawingml/2006/main" xmlns:r="http://schemas.openxmlformats.org/officeDocument/2006/relationships" xmlns:p="http://schemas.openxmlformats.org/presentationml/2006/main" type="tx">
   <p:cSld name="Puces">
     <p:spTree>
       <p:nvGrpSpPr>
@@ -1720,7 +1787,9 @@
       <p:sp>
         <p:nvSpPr>
           <p:cNvPr id="75" name="Body Level One…"/>
-          <p:cNvSpPr txBox="1"/>
+          <p:cNvSpPr txBox="1">
+            <a:spLocks noGrp="1"/>
+          </p:cNvSpPr>
           <p:nvPr>
             <p:ph type="body" sz="half" idx="1"/>
           </p:nvPr>
@@ -1779,7 +1848,6 @@
             </a:lvl5pPr>
           </a:lstStyle>
           <a:p>
-            <a:pPr/>
             <a:r>
               <a:t>Body Level One</a:t>
             </a:r>
@@ -1813,7 +1881,9 @@
       <p:sp>
         <p:nvSpPr>
           <p:cNvPr id="76" name="Slide Number"/>
-          <p:cNvSpPr txBox="1"/>
+          <p:cNvSpPr txBox="1">
+            <a:spLocks noGrp="1"/>
+          </p:cNvSpPr>
           <p:nvPr>
             <p:ph type="sldNum" sz="quarter" idx="2"/>
           </p:nvPr>
@@ -1827,8 +1897,10 @@
           <a:bodyPr/>
           <a:lstStyle/>
           <a:p>
-            <a:pPr/>
-            <a:fld id="{86CB4B4D-7CA3-9044-876B-883B54F8677D}" type="slidenum"/>
+            <a:fld id="{86CB4B4D-7CA3-9044-876B-883B54F8677D}" type="slidenum">
+              <a:t>‹#›</a:t>
+            </a:fld>
+            <a:endParaRPr/>
           </a:p>
         </p:txBody>
       </p:sp>
@@ -1837,12 +1909,12 @@
   <p:clrMapOvr>
     <a:masterClrMapping/>
   </p:clrMapOvr>
-  <p:transition xmlns:p14="http://schemas.microsoft.com/office/powerpoint/2010/main" spd="med" advClick="1"/>
+  <p:transition spd="med"/>
 </p:sldLayout>
 </file>
 
 <file path=ppt/slideLayouts/slideLayout9.xml><?xml version="1.0" encoding="utf-8"?>
-<p:sldLayout xmlns:a="http://schemas.openxmlformats.org/drawingml/2006/main" xmlns:r="http://schemas.openxmlformats.org/officeDocument/2006/relationships" xmlns:p="http://schemas.openxmlformats.org/presentationml/2006/main" xmlns:m="http://schemas.openxmlformats.org/officeDocument/2006/math" xmlns:a14="http://schemas.microsoft.com/office/drawing/2010/main" type="tx" showMasterSp="1" showMasterPhAnim="1">
+<p:sldLayout xmlns:a="http://schemas.openxmlformats.org/drawingml/2006/main" xmlns:r="http://schemas.openxmlformats.org/officeDocument/2006/relationships" xmlns:p="http://schemas.openxmlformats.org/presentationml/2006/main" type="tx">
   <p:cSld name="Photo - 3">
     <p:spTree>
       <p:nvGrpSpPr>
@@ -1861,7 +1933,9 @@
       <p:sp>
         <p:nvSpPr>
           <p:cNvPr id="83" name="Image"/>
-          <p:cNvSpPr/>
+          <p:cNvSpPr>
+            <a:spLocks noGrp="1"/>
+          </p:cNvSpPr>
           <p:nvPr>
             <p:ph type="pic" sz="quarter" idx="13"/>
           </p:nvPr>
@@ -1881,14 +1955,16 @@
           </a:bodyPr>
           <a:lstStyle/>
           <a:p>
-            <a:pPr/>
+            <a:endParaRPr/>
           </a:p>
         </p:txBody>
       </p:sp>
       <p:sp>
         <p:nvSpPr>
           <p:cNvPr id="84" name="Image"/>
-          <p:cNvSpPr/>
+          <p:cNvSpPr>
+            <a:spLocks noGrp="1"/>
+          </p:cNvSpPr>
           <p:nvPr>
             <p:ph type="pic" sz="quarter" idx="14"/>
           </p:nvPr>
@@ -1908,14 +1984,16 @@
           </a:bodyPr>
           <a:lstStyle/>
           <a:p>
-            <a:pPr/>
+            <a:endParaRPr/>
           </a:p>
         </p:txBody>
       </p:sp>
       <p:sp>
         <p:nvSpPr>
           <p:cNvPr id="85" name="Image"/>
-          <p:cNvSpPr/>
+          <p:cNvSpPr>
+            <a:spLocks noGrp="1"/>
+          </p:cNvSpPr>
           <p:nvPr>
             <p:ph type="pic" idx="15"/>
           </p:nvPr>
@@ -1935,14 +2013,16 @@
           </a:bodyPr>
           <a:lstStyle/>
           <a:p>
-            <a:pPr/>
+            <a:endParaRPr/>
           </a:p>
         </p:txBody>
       </p:sp>
       <p:sp>
         <p:nvSpPr>
           <p:cNvPr id="86" name="Slide Number"/>
-          <p:cNvSpPr txBox="1"/>
+          <p:cNvSpPr txBox="1">
+            <a:spLocks noGrp="1"/>
+          </p:cNvSpPr>
           <p:nvPr>
             <p:ph type="sldNum" sz="quarter" idx="2"/>
           </p:nvPr>
@@ -1956,8 +2036,10 @@
           <a:bodyPr/>
           <a:lstStyle/>
           <a:p>
-            <a:pPr/>
-            <a:fld id="{86CB4B4D-7CA3-9044-876B-883B54F8677D}" type="slidenum"/>
+            <a:fld id="{86CB4B4D-7CA3-9044-876B-883B54F8677D}" type="slidenum">
+              <a:t>‹#›</a:t>
+            </a:fld>
+            <a:endParaRPr/>
           </a:p>
         </p:txBody>
       </p:sp>
@@ -1966,18 +2048,19 @@
   <p:clrMapOvr>
     <a:masterClrMapping/>
   </p:clrMapOvr>
-  <p:transition xmlns:p14="http://schemas.microsoft.com/office/powerpoint/2010/main" spd="med" advClick="1"/>
+  <p:transition spd="med"/>
 </p:sldLayout>
 </file>
 
 <file path=ppt/slideMasters/slideMaster1.xml><?xml version="1.0" encoding="utf-8"?>
-<p:sldMaster xmlns:a="http://schemas.openxmlformats.org/drawingml/2006/main" xmlns:r="http://schemas.openxmlformats.org/officeDocument/2006/relationships" xmlns:p="http://schemas.openxmlformats.org/presentationml/2006/main" xmlns:m="http://schemas.openxmlformats.org/officeDocument/2006/math" xmlns:a14="http://schemas.microsoft.com/office/drawing/2010/main">
+<p:sldMaster xmlns:a="http://schemas.openxmlformats.org/drawingml/2006/main" xmlns:r="http://schemas.openxmlformats.org/officeDocument/2006/relationships" xmlns:p="http://schemas.openxmlformats.org/presentationml/2006/main">
   <p:cSld>
     <p:bg>
       <p:bgPr>
         <a:solidFill>
           <a:srgbClr val="FFFFFF"/>
         </a:solidFill>
+        <a:effectLst/>
       </p:bgPr>
     </p:bg>
     <p:spTree>
@@ -1997,7 +2080,9 @@
       <p:sp>
         <p:nvSpPr>
           <p:cNvPr id="2" name="Title Text"/>
-          <p:cNvSpPr txBox="1"/>
+          <p:cNvSpPr txBox="1">
+            <a:spLocks noGrp="1"/>
+          </p:cNvSpPr>
           <p:nvPr>
             <p:ph type="title"/>
           </p:nvPr>
@@ -2015,17 +2100,16 @@
           </a:ln>
           <a:extLst>
             <a:ext uri="{C572A759-6A51-4108-AA02-DFA0A04FC94B}">
-              <ma14:wrappingTextBoxFlag xmlns:ma14="http://schemas.microsoft.com/office/mac/drawingml/2011/main" val="1"/>
+              <ma14:wrappingTextBoxFlag xmlns:ma14="http://schemas.microsoft.com/office/mac/drawingml/2011/main" xmlns:a14="http://schemas.microsoft.com/office/drawing/2010/main" xmlns:m="http://schemas.openxmlformats.org/officeDocument/2006/math" xmlns="" val="1"/>
             </a:ext>
           </a:extLst>
         </p:spPr>
         <p:txBody>
           <a:bodyPr lIns="38100" tIns="38100" rIns="38100" bIns="38100" anchor="b">
-            <a:normAutofit fontScale="100000" lnSpcReduction="0"/>
+            <a:normAutofit/>
           </a:bodyPr>
           <a:lstStyle/>
           <a:p>
-            <a:pPr/>
             <a:r>
               <a:t>Title Text</a:t>
             </a:r>
@@ -2035,7 +2119,9 @@
       <p:sp>
         <p:nvSpPr>
           <p:cNvPr id="3" name="Body Level One…"/>
-          <p:cNvSpPr txBox="1"/>
+          <p:cNvSpPr txBox="1">
+            <a:spLocks noGrp="1"/>
+          </p:cNvSpPr>
           <p:nvPr>
             <p:ph type="body" idx="1"/>
           </p:nvPr>
@@ -2053,17 +2139,16 @@
           </a:ln>
           <a:extLst>
             <a:ext uri="{C572A759-6A51-4108-AA02-DFA0A04FC94B}">
-              <ma14:wrappingTextBoxFlag xmlns:ma14="http://schemas.microsoft.com/office/mac/drawingml/2011/main" val="1"/>
+              <ma14:wrappingTextBoxFlag xmlns:ma14="http://schemas.microsoft.com/office/mac/drawingml/2011/main" xmlns:a14="http://schemas.microsoft.com/office/drawing/2010/main" xmlns:m="http://schemas.openxmlformats.org/officeDocument/2006/math" xmlns="" val="1"/>
             </a:ext>
           </a:extLst>
         </p:spPr>
         <p:txBody>
           <a:bodyPr lIns="38100" tIns="38100" rIns="38100" bIns="38100">
-            <a:normAutofit fontScale="100000" lnSpcReduction="0"/>
+            <a:normAutofit/>
           </a:bodyPr>
           <a:lstStyle/>
           <a:p>
-            <a:pPr/>
             <a:r>
               <a:t>Body Level One</a:t>
             </a:r>
@@ -2097,7 +2182,9 @@
       <p:sp>
         <p:nvSpPr>
           <p:cNvPr id="4" name="Slide Number"/>
-          <p:cNvSpPr txBox="1"/>
+          <p:cNvSpPr txBox="1">
+            <a:spLocks noGrp="1"/>
+          </p:cNvSpPr>
           <p:nvPr>
             <p:ph type="sldNum" sz="quarter" idx="2"/>
           </p:nvPr>
@@ -2132,8 +2219,10 @@
             </a:lvl1pPr>
           </a:lstStyle>
           <a:p>
-            <a:pPr/>
-            <a:fld id="{86CB4B4D-7CA3-9044-876B-883B54F8677D}" type="slidenum"/>
+            <a:fld id="{86CB4B4D-7CA3-9044-876B-883B54F8677D}" type="slidenum">
+              <a:t>‹#›</a:t>
+            </a:fld>
+            <a:endParaRPr/>
           </a:p>
         </p:txBody>
       </p:sp>
@@ -2141,20 +2230,20 @@
   </p:cSld>
   <p:clrMap bg1="lt1" tx1="dk1" bg2="lt2" tx2="dk2" accent1="accent1" accent2="accent2" accent3="accent3" accent4="accent4" accent5="accent5" accent6="accent6" hlink="hlink" folHlink="folHlink"/>
   <p:sldLayoutIdLst>
-    <p:sldLayoutId id="2147483649" r:id="rId2"/>
-    <p:sldLayoutId id="2147483650" r:id="rId3"/>
-    <p:sldLayoutId id="2147483651" r:id="rId4"/>
-    <p:sldLayoutId id="2147483652" r:id="rId5"/>
-    <p:sldLayoutId id="2147483653" r:id="rId6"/>
-    <p:sldLayoutId id="2147483654" r:id="rId7"/>
-    <p:sldLayoutId id="2147483655" r:id="rId8"/>
-    <p:sldLayoutId id="2147483656" r:id="rId9"/>
-    <p:sldLayoutId id="2147483657" r:id="rId10"/>
-    <p:sldLayoutId id="2147483658" r:id="rId11"/>
-    <p:sldLayoutId id="2147483659" r:id="rId12"/>
-    <p:sldLayoutId id="2147483660" r:id="rId13"/>
+    <p:sldLayoutId id="2147483649" r:id="rId1"/>
+    <p:sldLayoutId id="2147483650" r:id="rId2"/>
+    <p:sldLayoutId id="2147483651" r:id="rId3"/>
+    <p:sldLayoutId id="2147483652" r:id="rId4"/>
+    <p:sldLayoutId id="2147483653" r:id="rId5"/>
+    <p:sldLayoutId id="2147483654" r:id="rId6"/>
+    <p:sldLayoutId id="2147483655" r:id="rId7"/>
+    <p:sldLayoutId id="2147483656" r:id="rId8"/>
+    <p:sldLayoutId id="2147483657" r:id="rId9"/>
+    <p:sldLayoutId id="2147483658" r:id="rId10"/>
+    <p:sldLayoutId id="2147483659" r:id="rId11"/>
+    <p:sldLayoutId id="2147483660" r:id="rId12"/>
   </p:sldLayoutIdLst>
-  <p:transition xmlns:p14="http://schemas.microsoft.com/office/powerpoint/2010/main" spd="med" advClick="1"/>
+  <p:transition spd="med"/>
   <p:txStyles>
     <p:titleStyle>
       <a:lvl1pPr marL="0" marR="0" indent="0" algn="ctr" defTabSz="584200" rtl="0" latinLnBrk="0">
@@ -2172,7 +2261,7 @@
         <a:buFontTx/>
         <a:buNone/>
         <a:tabLst/>
-        <a:defRPr b="0" baseline="0" cap="none" i="0" spc="0" strike="noStrike" sz="7800" u="none">
+        <a:defRPr sz="7800" b="0" i="0" u="none" strike="noStrike" cap="none" spc="0" baseline="0">
           <a:solidFill>
             <a:srgbClr val="000000"/>
           </a:solidFill>
@@ -2198,7 +2287,7 @@
         <a:buFontTx/>
         <a:buNone/>
         <a:tabLst/>
-        <a:defRPr b="0" baseline="0" cap="none" i="0" spc="0" strike="noStrike" sz="7800" u="none">
+        <a:defRPr sz="7800" b="0" i="0" u="none" strike="noStrike" cap="none" spc="0" baseline="0">
           <a:solidFill>
             <a:srgbClr val="000000"/>
           </a:solidFill>
@@ -2224,7 +2313,7 @@
         <a:buFontTx/>
         <a:buNone/>
         <a:tabLst/>
-        <a:defRPr b="0" baseline="0" cap="none" i="0" spc="0" strike="noStrike" sz="7800" u="none">
+        <a:defRPr sz="7800" b="0" i="0" u="none" strike="noStrike" cap="none" spc="0" baseline="0">
           <a:solidFill>
             <a:srgbClr val="000000"/>
           </a:solidFill>
@@ -2250,7 +2339,7 @@
         <a:buFontTx/>
         <a:buNone/>
         <a:tabLst/>
-        <a:defRPr b="0" baseline="0" cap="none" i="0" spc="0" strike="noStrike" sz="7800" u="none">
+        <a:defRPr sz="7800" b="0" i="0" u="none" strike="noStrike" cap="none" spc="0" baseline="0">
           <a:solidFill>
             <a:srgbClr val="000000"/>
           </a:solidFill>
@@ -2276,7 +2365,7 @@
         <a:buFontTx/>
         <a:buNone/>
         <a:tabLst/>
-        <a:defRPr b="0" baseline="0" cap="none" i="0" spc="0" strike="noStrike" sz="7800" u="none">
+        <a:defRPr sz="7800" b="0" i="0" u="none" strike="noStrike" cap="none" spc="0" baseline="0">
           <a:solidFill>
             <a:srgbClr val="000000"/>
           </a:solidFill>
@@ -2302,7 +2391,7 @@
         <a:buFontTx/>
         <a:buNone/>
         <a:tabLst/>
-        <a:defRPr b="0" baseline="0" cap="none" i="0" spc="0" strike="noStrike" sz="7800" u="none">
+        <a:defRPr sz="7800" b="0" i="0" u="none" strike="noStrike" cap="none" spc="0" baseline="0">
           <a:solidFill>
             <a:srgbClr val="000000"/>
           </a:solidFill>
@@ -2328,7 +2417,7 @@
         <a:buFontTx/>
         <a:buNone/>
         <a:tabLst/>
-        <a:defRPr b="0" baseline="0" cap="none" i="0" spc="0" strike="noStrike" sz="7800" u="none">
+        <a:defRPr sz="7800" b="0" i="0" u="none" strike="noStrike" cap="none" spc="0" baseline="0">
           <a:solidFill>
             <a:srgbClr val="000000"/>
           </a:solidFill>
@@ -2354,7 +2443,7 @@
         <a:buFontTx/>
         <a:buNone/>
         <a:tabLst/>
-        <a:defRPr b="0" baseline="0" cap="none" i="0" spc="0" strike="noStrike" sz="7800" u="none">
+        <a:defRPr sz="7800" b="0" i="0" u="none" strike="noStrike" cap="none" spc="0" baseline="0">
           <a:solidFill>
             <a:srgbClr val="000000"/>
           </a:solidFill>
@@ -2380,7 +2469,7 @@
         <a:buFontTx/>
         <a:buNone/>
         <a:tabLst/>
-        <a:defRPr b="0" baseline="0" cap="none" i="0" spc="0" strike="noStrike" sz="7800" u="none">
+        <a:defRPr sz="7800" b="0" i="0" u="none" strike="noStrike" cap="none" spc="0" baseline="0">
           <a:solidFill>
             <a:srgbClr val="000000"/>
           </a:solidFill>
@@ -2408,7 +2497,7 @@
         <a:buFontTx/>
         <a:buNone/>
         <a:tabLst/>
-        <a:defRPr b="0" baseline="0" cap="none" i="0" spc="0" strike="noStrike" sz="3000" u="none">
+        <a:defRPr sz="3000" b="0" i="0" u="none" strike="noStrike" cap="none" spc="0" baseline="0">
           <a:solidFill>
             <a:srgbClr val="000000"/>
           </a:solidFill>
@@ -2434,7 +2523,7 @@
         <a:buFontTx/>
         <a:buNone/>
         <a:tabLst/>
-        <a:defRPr b="0" baseline="0" cap="none" i="0" spc="0" strike="noStrike" sz="3000" u="none">
+        <a:defRPr sz="3000" b="0" i="0" u="none" strike="noStrike" cap="none" spc="0" baseline="0">
           <a:solidFill>
             <a:srgbClr val="000000"/>
           </a:solidFill>
@@ -2460,7 +2549,7 @@
         <a:buFontTx/>
         <a:buNone/>
         <a:tabLst/>
-        <a:defRPr b="0" baseline="0" cap="none" i="0" spc="0" strike="noStrike" sz="3000" u="none">
+        <a:defRPr sz="3000" b="0" i="0" u="none" strike="noStrike" cap="none" spc="0" baseline="0">
           <a:solidFill>
             <a:srgbClr val="000000"/>
           </a:solidFill>
@@ -2486,7 +2575,7 @@
         <a:buFontTx/>
         <a:buNone/>
         <a:tabLst/>
-        <a:defRPr b="0" baseline="0" cap="none" i="0" spc="0" strike="noStrike" sz="3000" u="none">
+        <a:defRPr sz="3000" b="0" i="0" u="none" strike="noStrike" cap="none" spc="0" baseline="0">
           <a:solidFill>
             <a:srgbClr val="000000"/>
           </a:solidFill>
@@ -2512,7 +2601,7 @@
         <a:buFontTx/>
         <a:buNone/>
         <a:tabLst/>
-        <a:defRPr b="0" baseline="0" cap="none" i="0" spc="0" strike="noStrike" sz="3000" u="none">
+        <a:defRPr sz="3000" b="0" i="0" u="none" strike="noStrike" cap="none" spc="0" baseline="0">
           <a:solidFill>
             <a:srgbClr val="000000"/>
           </a:solidFill>
@@ -2538,7 +2627,7 @@
         <a:buFontTx/>
         <a:buNone/>
         <a:tabLst/>
-        <a:defRPr b="0" baseline="0" cap="none" i="0" spc="0" strike="noStrike" sz="3000" u="none">
+        <a:defRPr sz="3000" b="0" i="0" u="none" strike="noStrike" cap="none" spc="0" baseline="0">
           <a:solidFill>
             <a:srgbClr val="000000"/>
           </a:solidFill>
@@ -2564,7 +2653,7 @@
         <a:buFontTx/>
         <a:buNone/>
         <a:tabLst/>
-        <a:defRPr b="0" baseline="0" cap="none" i="0" spc="0" strike="noStrike" sz="3000" u="none">
+        <a:defRPr sz="3000" b="0" i="0" u="none" strike="noStrike" cap="none" spc="0" baseline="0">
           <a:solidFill>
             <a:srgbClr val="000000"/>
           </a:solidFill>
@@ -2590,7 +2679,7 @@
         <a:buFontTx/>
         <a:buNone/>
         <a:tabLst/>
-        <a:defRPr b="0" baseline="0" cap="none" i="0" spc="0" strike="noStrike" sz="3000" u="none">
+        <a:defRPr sz="3000" b="0" i="0" u="none" strike="noStrike" cap="none" spc="0" baseline="0">
           <a:solidFill>
             <a:srgbClr val="000000"/>
           </a:solidFill>
@@ -2616,7 +2705,7 @@
         <a:buFontTx/>
         <a:buNone/>
         <a:tabLst/>
-        <a:defRPr b="0" baseline="0" cap="none" i="0" spc="0" strike="noStrike" sz="3000" u="none">
+        <a:defRPr sz="3000" b="0" i="0" u="none" strike="noStrike" cap="none" spc="0" baseline="0">
           <a:solidFill>
             <a:srgbClr val="000000"/>
           </a:solidFill>
@@ -2644,7 +2733,7 @@
         <a:buFontTx/>
         <a:buNone/>
         <a:tabLst/>
-        <a:defRPr b="0" baseline="0" cap="none" i="0" spc="0" strike="noStrike" sz="1600" u="none">
+        <a:defRPr sz="1600" b="0" i="0" u="none" strike="noStrike" cap="none" spc="0" baseline="0">
           <a:solidFill>
             <a:schemeClr val="tx1"/>
           </a:solidFill>
@@ -2670,7 +2759,7 @@
         <a:buFontTx/>
         <a:buNone/>
         <a:tabLst/>
-        <a:defRPr b="0" baseline="0" cap="none" i="0" spc="0" strike="noStrike" sz="1600" u="none">
+        <a:defRPr sz="1600" b="0" i="0" u="none" strike="noStrike" cap="none" spc="0" baseline="0">
           <a:solidFill>
             <a:schemeClr val="tx1"/>
           </a:solidFill>
@@ -2696,7 +2785,7 @@
         <a:buFontTx/>
         <a:buNone/>
         <a:tabLst/>
-        <a:defRPr b="0" baseline="0" cap="none" i="0" spc="0" strike="noStrike" sz="1600" u="none">
+        <a:defRPr sz="1600" b="0" i="0" u="none" strike="noStrike" cap="none" spc="0" baseline="0">
           <a:solidFill>
             <a:schemeClr val="tx1"/>
           </a:solidFill>
@@ -2722,7 +2811,7 @@
         <a:buFontTx/>
         <a:buNone/>
         <a:tabLst/>
-        <a:defRPr b="0" baseline="0" cap="none" i="0" spc="0" strike="noStrike" sz="1600" u="none">
+        <a:defRPr sz="1600" b="0" i="0" u="none" strike="noStrike" cap="none" spc="0" baseline="0">
           <a:solidFill>
             <a:schemeClr val="tx1"/>
           </a:solidFill>
@@ -2748,7 +2837,7 @@
         <a:buFontTx/>
         <a:buNone/>
         <a:tabLst/>
-        <a:defRPr b="0" baseline="0" cap="none" i="0" spc="0" strike="noStrike" sz="1600" u="none">
+        <a:defRPr sz="1600" b="0" i="0" u="none" strike="noStrike" cap="none" spc="0" baseline="0">
           <a:solidFill>
             <a:schemeClr val="tx1"/>
           </a:solidFill>
@@ -2774,7 +2863,7 @@
         <a:buFontTx/>
         <a:buNone/>
         <a:tabLst/>
-        <a:defRPr b="0" baseline="0" cap="none" i="0" spc="0" strike="noStrike" sz="1600" u="none">
+        <a:defRPr sz="1600" b="0" i="0" u="none" strike="noStrike" cap="none" spc="0" baseline="0">
           <a:solidFill>
             <a:schemeClr val="tx1"/>
           </a:solidFill>
@@ -2800,7 +2889,7 @@
         <a:buFontTx/>
         <a:buNone/>
         <a:tabLst/>
-        <a:defRPr b="0" baseline="0" cap="none" i="0" spc="0" strike="noStrike" sz="1600" u="none">
+        <a:defRPr sz="1600" b="0" i="0" u="none" strike="noStrike" cap="none" spc="0" baseline="0">
           <a:solidFill>
             <a:schemeClr val="tx1"/>
           </a:solidFill>
@@ -2826,7 +2915,7 @@
         <a:buFontTx/>
         <a:buNone/>
         <a:tabLst/>
-        <a:defRPr b="0" baseline="0" cap="none" i="0" spc="0" strike="noStrike" sz="1600" u="none">
+        <a:defRPr sz="1600" b="0" i="0" u="none" strike="noStrike" cap="none" spc="0" baseline="0">
           <a:solidFill>
             <a:schemeClr val="tx1"/>
           </a:solidFill>
@@ -2852,7 +2941,7 @@
         <a:buFontTx/>
         <a:buNone/>
         <a:tabLst/>
-        <a:defRPr b="0" baseline="0" cap="none" i="0" spc="0" strike="noStrike" sz="1600" u="none">
+        <a:defRPr sz="1600" b="0" i="0" u="none" strike="noStrike" cap="none" spc="0" baseline="0">
           <a:solidFill>
             <a:schemeClr val="tx1"/>
           </a:solidFill>
@@ -2869,7 +2958,7 @@
 </file>
 
 <file path=ppt/slides/slide1.xml><?xml version="1.0" encoding="utf-8"?>
-<p:sld xmlns:a="http://schemas.openxmlformats.org/drawingml/2006/main" xmlns:r="http://schemas.openxmlformats.org/officeDocument/2006/relationships" xmlns:p="http://schemas.openxmlformats.org/presentationml/2006/main" xmlns:m="http://schemas.openxmlformats.org/officeDocument/2006/math" xmlns:a14="http://schemas.microsoft.com/office/drawing/2010/main" showMasterSp="1" showMasterPhAnim="1">
+<p:sld xmlns:a="http://schemas.openxmlformats.org/drawingml/2006/main" xmlns:r="http://schemas.openxmlformats.org/officeDocument/2006/relationships" xmlns:p="http://schemas.openxmlformats.org/presentationml/2006/main">
   <p:cSld>
     <p:spTree>
       <p:nvGrpSpPr>
@@ -2904,7 +2993,7 @@
           </a:ln>
           <a:extLst>
             <a:ext uri="{C572A759-6A51-4108-AA02-DFA0A04FC94B}">
-              <ma14:wrappingTextBoxFlag xmlns:ma14="http://schemas.microsoft.com/office/mac/drawingml/2011/main" val="1"/>
+              <ma14:wrappingTextBoxFlag xmlns:ma14="http://schemas.microsoft.com/office/mac/drawingml/2011/main" xmlns:a14="http://schemas.microsoft.com/office/drawing/2010/main" xmlns:m="http://schemas.openxmlformats.org/officeDocument/2006/math" xmlns="" val="1"/>
             </a:ext>
           </a:extLst>
         </p:spPr>
@@ -2915,13 +3004,13 @@
           <a:lstStyle/>
           <a:p>
             <a:pPr>
-              <a:defRPr b="1" sz="8700">
+              <a:defRPr sz="8700" b="1">
                 <a:solidFill>
                   <a:srgbClr val="000000"/>
                 </a:solidFill>
-                <a:latin typeface="Circular Std"/>
-                <a:ea typeface="Circular Std"/>
-                <a:cs typeface="Circular Std"/>
+                <a:latin typeface="CircularStd-Bold"/>
+                <a:ea typeface="CircularStd-Bold"/>
+                <a:cs typeface="CircularStd-Bold"/>
                 <a:sym typeface="Circular Std"/>
               </a:defRPr>
             </a:pPr>
@@ -2931,13 +3020,13 @@
           </a:p>
           <a:p>
             <a:pPr>
-              <a:defRPr b="1" sz="8700">
+              <a:defRPr sz="8700" b="1">
                 <a:solidFill>
                   <a:srgbClr val="000000"/>
                 </a:solidFill>
-                <a:latin typeface="Circular Std"/>
-                <a:ea typeface="Circular Std"/>
-                <a:cs typeface="Circular Std"/>
+                <a:latin typeface="CircularStd-Bold"/>
+                <a:ea typeface="CircularStd-Bold"/>
+                <a:cs typeface="CircularStd-Bold"/>
                 <a:sym typeface="Circular Std"/>
               </a:defRPr>
             </a:pPr>
@@ -2947,13 +3036,13 @@
           </a:p>
           <a:p>
             <a:pPr>
-              <a:defRPr b="1" sz="8700">
+              <a:defRPr sz="8700" b="1">
                 <a:solidFill>
                   <a:srgbClr val="000000"/>
                 </a:solidFill>
-                <a:latin typeface="Circular Std"/>
-                <a:ea typeface="Circular Std"/>
-                <a:cs typeface="Circular Std"/>
+                <a:latin typeface="CircularStd-Bold"/>
+                <a:ea typeface="CircularStd-Bold"/>
+                <a:cs typeface="CircularStd-Bold"/>
                 <a:sym typeface="Circular Std"/>
               </a:defRPr>
             </a:pPr>
@@ -2963,26 +3052,27 @@
           </a:p>
           <a:p>
             <a:pPr>
-              <a:defRPr b="1" sz="7900">
+              <a:defRPr sz="7900" b="1">
                 <a:solidFill>
                   <a:srgbClr val="FFFFFF"/>
                 </a:solidFill>
-                <a:latin typeface="Circular Std"/>
-                <a:ea typeface="Circular Std"/>
-                <a:cs typeface="Circular Std"/>
+                <a:latin typeface="CircularStd-Bold"/>
+                <a:ea typeface="CircularStd-Bold"/>
+                <a:cs typeface="CircularStd-Bold"/>
                 <a:sym typeface="Circular Std"/>
               </a:defRPr>
             </a:pPr>
+            <a:endParaRPr/>
           </a:p>
           <a:p>
             <a:pPr>
-              <a:defRPr b="1" sz="6200">
+              <a:defRPr sz="6200" b="1">
                 <a:solidFill>
                   <a:srgbClr val="000000"/>
                 </a:solidFill>
-                <a:latin typeface="Circular Std"/>
-                <a:ea typeface="Circular Std"/>
-                <a:cs typeface="Circular Std"/>
+                <a:latin typeface="CircularStd-Bold"/>
+                <a:ea typeface="CircularStd-Bold"/>
+                <a:cs typeface="CircularStd-Bold"/>
                 <a:sym typeface="Circular Std"/>
               </a:defRPr>
             </a:pPr>
@@ -3001,9 +3091,7 @@
           <p:nvPr/>
         </p:nvPicPr>
         <p:blipFill>
-          <a:blip r:embed="rId2">
-            <a:extLst/>
-          </a:blip>
+          <a:blip r:embed="rId2"/>
           <a:stretch>
             <a:fillRect/>
           </a:stretch>
@@ -3030,9 +3118,7 @@
           <p:nvPr/>
         </p:nvPicPr>
         <p:blipFill>
-          <a:blip r:embed="rId3">
-            <a:extLst/>
-          </a:blip>
+          <a:blip r:embed="rId3"/>
           <a:stretch>
             <a:fillRect/>
           </a:stretch>
@@ -3055,12 +3141,12 @@
   <p:clrMapOvr>
     <a:masterClrMapping/>
   </p:clrMapOvr>
-  <p:transition xmlns:p14="http://schemas.microsoft.com/office/powerpoint/2010/main" spd="med" advClick="1"/>
+  <p:transition spd="med"/>
 </p:sld>
 </file>
 
 <file path=ppt/slides/slide10.xml><?xml version="1.0" encoding="utf-8"?>
-<p:sld xmlns:a="http://schemas.openxmlformats.org/drawingml/2006/main" xmlns:r="http://schemas.openxmlformats.org/officeDocument/2006/relationships" xmlns:p="http://schemas.openxmlformats.org/presentationml/2006/main" xmlns:m="http://schemas.openxmlformats.org/officeDocument/2006/math" xmlns:a14="http://schemas.microsoft.com/office/drawing/2010/main" showMasterSp="1" showMasterPhAnim="1">
+<p:sld xmlns:a="http://schemas.openxmlformats.org/drawingml/2006/main" xmlns:r="http://schemas.openxmlformats.org/officeDocument/2006/relationships" xmlns:p="http://schemas.openxmlformats.org/presentationml/2006/main">
   <p:cSld>
     <p:spTree>
       <p:nvGrpSpPr>
@@ -3084,16 +3170,22 @@
         </p:nvGraphicFramePr>
         <p:xfrm>
           <a:off x="556592" y="6588199"/>
-          <a:ext cx="11899554" cy="2914502"/>
+          <a:ext cx="11891615" cy="2903220"/>
         </p:xfrm>
-        <a:graphic xmlns:a="http://schemas.openxmlformats.org/drawingml/2006/main">
+        <a:graphic>
           <a:graphicData uri="http://schemas.openxmlformats.org/drawingml/2006/table">
             <a:tbl>
-              <a:tblPr firstCol="0" firstRow="0" lastCol="0" lastRow="0" bandCol="0" bandRow="0" rtl="0">
+              <a:tblPr>
                 <a:tableStyleId>{C7B018BB-80A7-4F77-B60F-C8B233D01FF8}</a:tableStyleId>
               </a:tblPr>
               <a:tblGrid>
-                <a:gridCol w="11891615"/>
+                <a:gridCol w="11891615">
+                  <a:extLst>
+                    <a:ext uri="{9D8B030D-6E8A-4147-A177-3AD203B41FA5}">
+                      <a16:colId xmlns:a16="http://schemas.microsoft.com/office/drawing/2014/main" val="20000"/>
+                    </a:ext>
+                  </a:extLst>
+                </a:gridCol>
               </a:tblGrid>
               <a:tr h="2901801">
                 <a:tc>
@@ -3117,9 +3209,10 @@
                         </a:defRPr>
                       </a:pPr>
                       <a:r>
+                        <a:rPr dirty="0"/>
                         <a:t>names = [“Zoe”, “John”, “Zack”]</a:t>
                       </a:r>
-                      <a:endParaRPr>
+                      <a:endParaRPr dirty="0">
                         <a:latin typeface="Ubuntu Mono"/>
                         <a:ea typeface="Ubuntu Mono"/>
                         <a:cs typeface="Ubuntu Mono"/>
@@ -3141,6 +3234,12 @@
                           <a:sym typeface="Helvetica"/>
                         </a:defRPr>
                       </a:pPr>
+                      <a:endParaRPr dirty="0">
+                        <a:latin typeface="Ubuntu Mono"/>
+                        <a:ea typeface="Ubuntu Mono"/>
+                        <a:cs typeface="Ubuntu Mono"/>
+                        <a:sym typeface="Ubuntu Mono"/>
+                      </a:endParaRPr>
                     </a:p>
                     <a:p>
                       <a:pPr algn="l" defTabSz="457200">
@@ -3158,7 +3257,7 @@
                         </a:defRPr>
                       </a:pPr>
                       <a:r>
-                        <a:rPr>
+                        <a:rPr dirty="0" err="1">
                           <a:solidFill>
                             <a:schemeClr val="accent1">
                               <a:hueOff val="273561"/>
@@ -3171,10 +3270,26 @@
                           <a:cs typeface="Consolas"/>
                           <a:sym typeface="Consolas"/>
                         </a:rPr>
-                        <a:t>names.each do </a:t>
+                        <a:t>names.each</a:t>
                       </a:r>
                       <a:r>
-                        <a:rPr>
+                        <a:rPr dirty="0">
+                          <a:solidFill>
+                            <a:schemeClr val="accent1">
+                              <a:hueOff val="273561"/>
+                              <a:satOff val="2937"/>
+                              <a:lumOff val="-22233"/>
+                            </a:schemeClr>
+                          </a:solidFill>
+                          <a:latin typeface="Consolas"/>
+                          <a:ea typeface="Consolas"/>
+                          <a:cs typeface="Consolas"/>
+                          <a:sym typeface="Consolas"/>
+                        </a:rPr>
+                        <a:t> do </a:t>
+                      </a:r>
+                      <a:r>
+                        <a:rPr dirty="0">
                           <a:solidFill>
                             <a:srgbClr val="FA1116"/>
                           </a:solidFill>
@@ -3185,15 +3300,6 @@
                         </a:rPr>
                         <a:t>| name |</a:t>
                       </a:r>
-                      <a:endParaRPr>
-                        <a:solidFill>
-                          <a:srgbClr val="FA1116"/>
-                        </a:solidFill>
-                        <a:latin typeface="Consolas"/>
-                        <a:ea typeface="Consolas"/>
-                        <a:cs typeface="Consolas"/>
-                        <a:sym typeface="Consolas"/>
-                      </a:endParaRPr>
                     </a:p>
                     <a:p>
                       <a:pPr algn="l" defTabSz="457200">
@@ -3211,8 +3317,22 @@
                         </a:defRPr>
                       </a:pPr>
                       <a:r>
-                        <a:t>  puts reversed_name = name.reverse</a:t>
+                        <a:rPr dirty="0"/>
+                        <a:t>  puts </a:t>
                       </a:r>
+                      <a:r>
+                        <a:rPr dirty="0" err="1"/>
+                        <a:t>reversed_name</a:t>
+                      </a:r>
+                      <a:r>
+                        <a:rPr dirty="0"/>
+                        <a:t> = </a:t>
+                      </a:r>
+                      <a:r>
+                        <a:rPr dirty="0" err="1"/>
+                        <a:t>name.reverse</a:t>
+                      </a:r>
+                      <a:endParaRPr dirty="0"/>
                     </a:p>
                     <a:p>
                       <a:pPr algn="l" defTabSz="457200">
@@ -3231,6 +3351,7 @@
                         </a:defRPr>
                       </a:pPr>
                       <a:r>
+                        <a:rPr dirty="0"/>
                         <a:t>end</a:t>
                       </a:r>
                     </a:p>
@@ -3249,6 +3370,7 @@
                           <a:sym typeface="Ubuntu Mono"/>
                         </a:defRPr>
                       </a:pPr>
+                      <a:endParaRPr dirty="0"/>
                     </a:p>
                     <a:p>
                       <a:pPr algn="l" defTabSz="457200">
@@ -3266,7 +3388,7 @@
                         </a:defRPr>
                       </a:pPr>
                       <a:r>
-                        <a:rPr sz="2300">
+                        <a:rPr sz="2300" dirty="0" err="1">
                           <a:solidFill>
                             <a:schemeClr val="accent1">
                               <a:hueOff val="273561"/>
@@ -3279,10 +3401,26 @@
                           <a:cs typeface="Consolas"/>
                           <a:sym typeface="Consolas"/>
                         </a:rPr>
-                        <a:t>names.each {</a:t>
+                        <a:t>names.each</a:t>
                       </a:r>
                       <a:r>
-                        <a:rPr sz="2300">
+                        <a:rPr sz="2300" dirty="0">
+                          <a:solidFill>
+                            <a:schemeClr val="accent1">
+                              <a:hueOff val="273561"/>
+                              <a:satOff val="2937"/>
+                              <a:lumOff val="-22233"/>
+                            </a:schemeClr>
+                          </a:solidFill>
+                          <a:latin typeface="Consolas"/>
+                          <a:ea typeface="Consolas"/>
+                          <a:cs typeface="Consolas"/>
+                          <a:sym typeface="Consolas"/>
+                        </a:rPr>
+                        <a:t> {</a:t>
+                      </a:r>
+                      <a:r>
+                        <a:rPr sz="2300" dirty="0">
                           <a:solidFill>
                             <a:schemeClr val="accent5">
                               <a:hueOff val="-444211"/>
@@ -3298,7 +3436,7 @@
                         <a:t> </a:t>
                       </a:r>
                       <a:r>
-                        <a:rPr sz="2300">
+                        <a:rPr sz="2300" dirty="0">
                           <a:solidFill>
                             <a:srgbClr val="FA1116"/>
                           </a:solidFill>
@@ -3307,10 +3445,46 @@
                           <a:cs typeface="Consolas"/>
                           <a:sym typeface="Consolas"/>
                         </a:rPr>
-                        <a:t>| name | puts reversed_name = name.reverse</a:t>
+                        <a:t>| name | puts </a:t>
                       </a:r>
                       <a:r>
-                        <a:rPr sz="2300">
+                        <a:rPr sz="2300" dirty="0" err="1">
+                          <a:solidFill>
+                            <a:srgbClr val="FA1116"/>
+                          </a:solidFill>
+                          <a:latin typeface="Consolas"/>
+                          <a:ea typeface="Consolas"/>
+                          <a:cs typeface="Consolas"/>
+                          <a:sym typeface="Consolas"/>
+                        </a:rPr>
+                        <a:t>reversed_name</a:t>
+                      </a:r>
+                      <a:r>
+                        <a:rPr sz="2300" dirty="0">
+                          <a:solidFill>
+                            <a:srgbClr val="FA1116"/>
+                          </a:solidFill>
+                          <a:latin typeface="Consolas"/>
+                          <a:ea typeface="Consolas"/>
+                          <a:cs typeface="Consolas"/>
+                          <a:sym typeface="Consolas"/>
+                        </a:rPr>
+                        <a:t> = </a:t>
+                      </a:r>
+                      <a:r>
+                        <a:rPr sz="2300" dirty="0" err="1">
+                          <a:solidFill>
+                            <a:srgbClr val="FA1116"/>
+                          </a:solidFill>
+                          <a:latin typeface="Consolas"/>
+                          <a:ea typeface="Consolas"/>
+                          <a:cs typeface="Consolas"/>
+                          <a:sym typeface="Consolas"/>
+                        </a:rPr>
+                        <a:t>name.reverse</a:t>
+                      </a:r>
+                      <a:r>
+                        <a:rPr sz="2300" dirty="0">
                           <a:solidFill>
                             <a:schemeClr val="accent5">
                               <a:hueOff val="-444211"/>
@@ -3326,7 +3500,7 @@
                         <a:t> </a:t>
                       </a:r>
                       <a:r>
-                        <a:rPr sz="2300">
+                        <a:rPr sz="2300" dirty="0">
                           <a:solidFill>
                             <a:schemeClr val="accent1">
                               <a:hueOff val="273561"/>
@@ -3343,7 +3517,7 @@
                       </a:r>
                     </a:p>
                   </a:txBody>
-                  <a:tcPr marL="50800" marR="50800" marT="50800" marB="50800" anchor="ctr" anchorCtr="0" horzOverflow="overflow">
+                  <a:tcPr marL="50800" marR="50800" marT="50800" marB="50800" anchor="ctr" horzOverflow="overflow">
                     <a:lnL w="3175">
                       <a:solidFill>
                         <a:srgbClr val="FFFFFF"/>
@@ -3373,6 +3547,11 @@
                     </a:solidFill>
                   </a:tcPr>
                 </a:tc>
+                <a:extLst>
+                  <a:ext uri="{0D108BD9-81ED-4DB2-BD59-A6C34878D82A}">
+                    <a16:rowId xmlns:a16="http://schemas.microsoft.com/office/drawing/2014/main" val="10000"/>
+                  </a:ext>
+                </a:extLst>
               </a:tr>
             </a:tbl>
           </a:graphicData>
@@ -3397,7 +3576,7 @@
           </a:ln>
           <a:extLst>
             <a:ext uri="{C572A759-6A51-4108-AA02-DFA0A04FC94B}">
-              <ma14:wrappingTextBoxFlag xmlns:ma14="http://schemas.microsoft.com/office/mac/drawingml/2011/main" val="1"/>
+              <ma14:wrappingTextBoxFlag xmlns:ma14="http://schemas.microsoft.com/office/mac/drawingml/2011/main" xmlns:a14="http://schemas.microsoft.com/office/drawing/2010/main" xmlns:m="http://schemas.openxmlformats.org/officeDocument/2006/math" xmlns="" val="1"/>
             </a:ext>
           </a:extLst>
         </p:spPr>
@@ -3456,7 +3635,7 @@
           </a:ln>
           <a:extLst>
             <a:ext uri="{C572A759-6A51-4108-AA02-DFA0A04FC94B}">
-              <ma14:wrappingTextBoxFlag xmlns:ma14="http://schemas.microsoft.com/office/mac/drawingml/2011/main" val="1"/>
+              <ma14:wrappingTextBoxFlag xmlns:ma14="http://schemas.microsoft.com/office/mac/drawingml/2011/main" xmlns:a14="http://schemas.microsoft.com/office/drawing/2010/main" xmlns:m="http://schemas.openxmlformats.org/officeDocument/2006/math" xmlns="" val="1"/>
             </a:ext>
           </a:extLst>
         </p:spPr>
@@ -3475,31 +3654,35 @@
               </a:defRPr>
             </a:pPr>
             <a:r>
+              <a:rPr dirty="0"/>
               <a:t>Blocks are chunks of code between curly braces </a:t>
             </a:r>
             <a:r>
-              <a:rPr b="1"/>
+              <a:rPr b="1" dirty="0"/>
               <a:t>{}</a:t>
             </a:r>
             <a:r>
+              <a:rPr dirty="0"/>
               <a:t> or between the keywords </a:t>
             </a:r>
             <a:r>
-              <a:rPr b="1"/>
+              <a:rPr b="1" dirty="0"/>
               <a:t>do</a:t>
             </a:r>
             <a:r>
+              <a:rPr dirty="0"/>
               <a:t> and </a:t>
             </a:r>
             <a:r>
-              <a:rPr b="1"/>
+              <a:rPr b="1" dirty="0"/>
               <a:t>end</a:t>
             </a:r>
             <a:r>
+              <a:rPr dirty="0"/>
               <a:t>, and are an argument of a method. (That’s what we've been doing with </a:t>
             </a:r>
             <a:r>
-              <a:rPr>
+              <a:rPr dirty="0">
                 <a:solidFill>
                   <a:schemeClr val="accent1">
                     <a:hueOff val="273561"/>
@@ -3515,6 +3698,7 @@
               <a:t>.each</a:t>
             </a:r>
             <a:r>
+              <a:rPr dirty="0"/>
               <a:t> this whole time, for instance!)</a:t>
             </a:r>
           </a:p>
@@ -3527,6 +3711,7 @@
                 <a:sym typeface="Helvetica"/>
               </a:defRPr>
             </a:pPr>
+            <a:endParaRPr dirty="0"/>
           </a:p>
           <a:p>
             <a:pPr algn="l" defTabSz="457200">
@@ -3541,20 +3726,23 @@
               </a:defRPr>
             </a:pPr>
             <a:r>
+              <a:rPr dirty="0"/>
               <a:t>Unlike methods, blocks can only be called </a:t>
             </a:r>
             <a:r>
-              <a:rPr b="1"/>
+              <a:rPr b="1" dirty="0"/>
               <a:t>once</a:t>
             </a:r>
             <a:r>
+              <a:rPr dirty="0"/>
               <a:t> and in the </a:t>
             </a:r>
             <a:r>
-              <a:rPr b="1"/>
+              <a:rPr b="1" dirty="0"/>
               <a:t>specific context</a:t>
             </a:r>
             <a:r>
+              <a:rPr dirty="0"/>
               <a:t> under which they were created</a:t>
             </a:r>
           </a:p>
@@ -3565,12 +3753,12 @@
   <p:clrMapOvr>
     <a:masterClrMapping/>
   </p:clrMapOvr>
-  <p:transition xmlns:p14="http://schemas.microsoft.com/office/powerpoint/2010/main" spd="med" advClick="1"/>
+  <p:transition spd="med"/>
 </p:sld>
 </file>
 
 <file path=ppt/slides/slide11.xml><?xml version="1.0" encoding="utf-8"?>
-<p:sld xmlns:a="http://schemas.openxmlformats.org/drawingml/2006/main" xmlns:r="http://schemas.openxmlformats.org/officeDocument/2006/relationships" xmlns:p="http://schemas.openxmlformats.org/presentationml/2006/main" xmlns:m="http://schemas.openxmlformats.org/officeDocument/2006/math" xmlns:a14="http://schemas.microsoft.com/office/drawing/2010/main" showMasterSp="1" showMasterPhAnim="1">
+<p:sld xmlns:a="http://schemas.openxmlformats.org/drawingml/2006/main" xmlns:r="http://schemas.openxmlformats.org/officeDocument/2006/relationships" xmlns:p="http://schemas.openxmlformats.org/presentationml/2006/main">
   <p:cSld>
     <p:spTree>
       <p:nvGrpSpPr>
@@ -3622,7 +3810,7 @@
             <a:effectLst/>
             <a:extLst>
               <a:ext uri="{C572A759-6A51-4108-AA02-DFA0A04FC94B}">
-                <ma14:wrappingTextBoxFlag xmlns:ma14="http://schemas.microsoft.com/office/mac/drawingml/2011/main" val="1"/>
+                <ma14:wrappingTextBoxFlag xmlns:ma14="http://schemas.microsoft.com/office/mac/drawingml/2011/main" xmlns:a14="http://schemas.microsoft.com/office/drawing/2010/main" xmlns:m="http://schemas.openxmlformats.org/officeDocument/2006/math" xmlns="" val="1"/>
               </a:ext>
             </a:extLst>
           </p:spPr>
@@ -3644,7 +3832,6 @@
               </a:lvl1pPr>
             </a:lstStyle>
             <a:p>
-              <a:pPr/>
               <a:r>
                 <a:t>Thank</a:t>
               </a:r>
@@ -3677,7 +3864,7 @@
             <a:effectLst/>
             <a:extLst>
               <a:ext uri="{C572A759-6A51-4108-AA02-DFA0A04FC94B}">
-                <ma14:wrappingTextBoxFlag xmlns:ma14="http://schemas.microsoft.com/office/mac/drawingml/2011/main" val="1"/>
+                <ma14:wrappingTextBoxFlag xmlns:ma14="http://schemas.microsoft.com/office/mac/drawingml/2011/main" xmlns:a14="http://schemas.microsoft.com/office/drawing/2010/main" xmlns:m="http://schemas.openxmlformats.org/officeDocument/2006/math" xmlns="" val="1"/>
               </a:ext>
             </a:extLst>
           </p:spPr>
@@ -3699,7 +3886,6 @@
               </a:lvl1pPr>
             </a:lstStyle>
             <a:p>
-              <a:pPr/>
               <a:r>
                 <a:t>you.</a:t>
               </a:r>
@@ -3716,9 +3902,7 @@
           <p:nvPr/>
         </p:nvPicPr>
         <p:blipFill>
-          <a:blip r:embed="rId2">
-            <a:extLst/>
-          </a:blip>
+          <a:blip r:embed="rId2"/>
           <a:stretch>
             <a:fillRect/>
           </a:stretch>
@@ -3741,12 +3925,12 @@
   <p:clrMapOvr>
     <a:masterClrMapping/>
   </p:clrMapOvr>
-  <p:transition xmlns:p14="http://schemas.microsoft.com/office/powerpoint/2010/main" spd="med" advClick="1"/>
+  <p:transition spd="med"/>
 </p:sld>
 </file>
 
 <file path=ppt/slides/slide2.xml><?xml version="1.0" encoding="utf-8"?>
-<p:sld xmlns:a="http://schemas.openxmlformats.org/drawingml/2006/main" xmlns:r="http://schemas.openxmlformats.org/officeDocument/2006/relationships" xmlns:p="http://schemas.openxmlformats.org/presentationml/2006/main" xmlns:m="http://schemas.openxmlformats.org/officeDocument/2006/math" xmlns:a14="http://schemas.microsoft.com/office/drawing/2010/main" showMasterSp="1" showMasterPhAnim="1">
+<p:sld xmlns:a="http://schemas.openxmlformats.org/drawingml/2006/main" xmlns:r="http://schemas.openxmlformats.org/officeDocument/2006/relationships" xmlns:p="http://schemas.openxmlformats.org/presentationml/2006/main">
   <p:cSld>
     <p:spTree>
       <p:nvGrpSpPr>
@@ -3781,7 +3965,7 @@
           </a:ln>
           <a:extLst>
             <a:ext uri="{C572A759-6A51-4108-AA02-DFA0A04FC94B}">
-              <ma14:wrappingTextBoxFlag xmlns:ma14="http://schemas.microsoft.com/office/mac/drawingml/2011/main" val="1"/>
+              <ma14:wrappingTextBoxFlag xmlns:ma14="http://schemas.microsoft.com/office/mac/drawingml/2011/main" xmlns:a14="http://schemas.microsoft.com/office/drawing/2010/main" xmlns:m="http://schemas.openxmlformats.org/officeDocument/2006/math" xmlns="" val="1"/>
             </a:ext>
           </a:extLst>
         </p:spPr>
@@ -3816,23 +4000,7 @@
                   <a:srgbClr val="363636"/>
                 </a:solidFill>
               </a:rPr>
-              <a:t>he </a:t>
-            </a:r>
-            <a:r>
-              <a:rPr>
-                <a:solidFill>
-                  <a:srgbClr val="363636"/>
-                </a:solidFill>
-              </a:rPr>
-              <a:t>sort</a:t>
-            </a:r>
-            <a:r>
-              <a:rPr>
-                <a:solidFill>
-                  <a:srgbClr val="363636"/>
-                </a:solidFill>
-              </a:rPr>
-              <a:t> built-in method</a:t>
+              <a:t>he sort built-in method</a:t>
             </a:r>
           </a:p>
         </p:txBody>
@@ -3856,7 +4024,7 @@
           </a:ln>
           <a:extLst>
             <a:ext uri="{C572A759-6A51-4108-AA02-DFA0A04FC94B}">
-              <ma14:wrappingTextBoxFlag xmlns:ma14="http://schemas.microsoft.com/office/mac/drawingml/2011/main" val="1"/>
+              <ma14:wrappingTextBoxFlag xmlns:ma14="http://schemas.microsoft.com/office/mac/drawingml/2011/main" xmlns:a14="http://schemas.microsoft.com/office/drawing/2010/main" xmlns:m="http://schemas.openxmlformats.org/officeDocument/2006/math" xmlns="" val="1"/>
             </a:ext>
           </a:extLst>
         </p:spPr>
@@ -3875,10 +4043,11 @@
               </a:defRPr>
             </a:pPr>
             <a:r>
+              <a:rPr dirty="0"/>
               <a:t>The </a:t>
             </a:r>
             <a:r>
-              <a:rPr>
+              <a:rPr dirty="0">
                 <a:solidFill>
                   <a:schemeClr val="accent1">
                     <a:hueOff val="273561"/>
@@ -3894,6 +4063,7 @@
               <a:t>sort</a:t>
             </a:r>
             <a:r>
+              <a:rPr dirty="0"/>
               <a:t> method is one of Ruby’s many built-in methods</a:t>
             </a:r>
           </a:p>
@@ -3906,6 +4076,7 @@
                 <a:sym typeface="Helvetica"/>
               </a:defRPr>
             </a:pPr>
+            <a:endParaRPr dirty="0"/>
           </a:p>
           <a:p>
             <a:pPr algn="l">
@@ -3917,12 +4088,13 @@
               </a:defRPr>
             </a:pPr>
             <a:r>
+              <a:rPr dirty="0"/>
               <a:t>It sorts the elements within a collection, from A - Z or from smaller to larger</a:t>
             </a:r>
           </a:p>
           <a:p>
             <a:pPr algn="l">
-              <a:defRPr b="1" sz="3500">
+              <a:defRPr sz="3500" b="1">
                 <a:solidFill>
                   <a:schemeClr val="accent5">
                     <a:hueOff val="-444211"/>
@@ -3936,6 +4108,7 @@
                 <a:sym typeface="Helvetica"/>
               </a:defRPr>
             </a:pPr>
+            <a:endParaRPr dirty="0"/>
           </a:p>
           <a:p>
             <a:pPr algn="l">
@@ -3954,6 +4127,7 @@
               </a:defRPr>
             </a:pPr>
             <a:r>
+              <a:rPr dirty="0"/>
               <a:t>names = [“Mary”, “John”, “Zack”]</a:t>
             </a:r>
           </a:p>
@@ -3974,8 +4148,14 @@
               </a:defRPr>
             </a:pPr>
             <a:r>
-              <a:t>puts names.sort</a:t>
-            </a:r>
+              <a:rPr dirty="0"/>
+              <a:t>puts </a:t>
+            </a:r>
+            <a:r>
+              <a:rPr dirty="0" err="1"/>
+              <a:t>names.sort</a:t>
+            </a:r>
+            <a:endParaRPr dirty="0"/>
           </a:p>
           <a:p>
             <a:pPr algn="l" defTabSz="457200">
@@ -3992,6 +4172,7 @@
                 <a:sym typeface="Ubuntu Mono"/>
               </a:defRPr>
             </a:pPr>
+            <a:endParaRPr dirty="0"/>
           </a:p>
           <a:p>
             <a:pPr algn="l">
@@ -4006,6 +4187,7 @@
               </a:defRPr>
             </a:pPr>
             <a:r>
+              <a:rPr dirty="0"/>
               <a:t># Will print out John, Mary, Zack</a:t>
             </a:r>
           </a:p>
@@ -4024,6 +4206,7 @@
                 <a:sym typeface="Ubuntu Mono"/>
               </a:defRPr>
             </a:pPr>
+            <a:endParaRPr dirty="0"/>
           </a:p>
           <a:p>
             <a:pPr algn="l" defTabSz="457200">
@@ -4038,10 +4221,11 @@
               </a:defRPr>
             </a:pPr>
             <a:r>
+              <a:rPr dirty="0"/>
               <a:t>If we want to reverse the sorting, we just use the </a:t>
             </a:r>
             <a:r>
-              <a:rPr>
+              <a:rPr dirty="0">
                 <a:solidFill>
                   <a:schemeClr val="accent1">
                     <a:hueOff val="273561"/>
@@ -4057,21 +4241,23 @@
               <a:t>reverse</a:t>
             </a:r>
             <a:r>
-              <a:rPr b="1"/>
+              <a:rPr b="1" dirty="0"/>
               <a:t> </a:t>
             </a:r>
             <a:r>
+              <a:rPr dirty="0"/>
               <a:t>method </a:t>
             </a:r>
             <a:r>
-              <a:rPr i="1"/>
+              <a:rPr i="1" dirty="0"/>
               <a:t>after</a:t>
             </a:r>
             <a:r>
+              <a:rPr dirty="0"/>
               <a:t> the </a:t>
             </a:r>
             <a:r>
-              <a:rPr>
+              <a:rPr dirty="0">
                 <a:solidFill>
                   <a:schemeClr val="accent1">
                     <a:hueOff val="273561"/>
@@ -4087,6 +4273,7 @@
               <a:t>sort</a:t>
             </a:r>
             <a:r>
+              <a:rPr dirty="0"/>
               <a:t> method!</a:t>
             </a:r>
           </a:p>
@@ -4097,12 +4284,12 @@
   <p:clrMapOvr>
     <a:masterClrMapping/>
   </p:clrMapOvr>
-  <p:transition xmlns:p14="http://schemas.microsoft.com/office/powerpoint/2010/main" spd="med" advClick="1"/>
+  <p:transition spd="med"/>
 </p:sld>
 </file>
 
 <file path=ppt/slides/slide3.xml><?xml version="1.0" encoding="utf-8"?>
-<p:sld xmlns:a="http://schemas.openxmlformats.org/drawingml/2006/main" xmlns:r="http://schemas.openxmlformats.org/officeDocument/2006/relationships" xmlns:p="http://schemas.openxmlformats.org/presentationml/2006/main" xmlns:m="http://schemas.openxmlformats.org/officeDocument/2006/math" xmlns:a14="http://schemas.microsoft.com/office/drawing/2010/main" showMasterSp="1" showMasterPhAnim="1">
+<p:sld xmlns:a="http://schemas.openxmlformats.org/drawingml/2006/main" xmlns:r="http://schemas.openxmlformats.org/officeDocument/2006/relationships" xmlns:p="http://schemas.openxmlformats.org/presentationml/2006/main">
   <p:cSld>
     <p:spTree>
       <p:nvGrpSpPr>
@@ -4137,7 +4324,7 @@
           </a:ln>
           <a:extLst>
             <a:ext uri="{C572A759-6A51-4108-AA02-DFA0A04FC94B}">
-              <ma14:wrappingTextBoxFlag xmlns:ma14="http://schemas.microsoft.com/office/mac/drawingml/2011/main" val="1"/>
+              <ma14:wrappingTextBoxFlag xmlns:ma14="http://schemas.microsoft.com/office/mac/drawingml/2011/main" xmlns:a14="http://schemas.microsoft.com/office/drawing/2010/main" xmlns:m="http://schemas.openxmlformats.org/officeDocument/2006/math" xmlns="" val="1"/>
             </a:ext>
           </a:extLst>
         </p:spPr>
@@ -4172,29 +4359,8 @@
                   <a:srgbClr val="363636"/>
                 </a:solidFill>
               </a:rPr>
-              <a:t>he </a:t>
-            </a:r>
-            <a:r>
-              <a:rPr>
-                <a:solidFill>
-                  <a:srgbClr val="363636"/>
-                </a:solidFill>
-              </a:rPr>
-              <a:t>sort</a:t>
-            </a:r>
-            <a:r>
-              <a:rPr>
-                <a:solidFill>
-                  <a:srgbClr val="363636"/>
-                </a:solidFill>
-              </a:rPr>
-              <a:t> built-in method</a:t>
-            </a:r>
-            <a:endParaRPr>
-              <a:solidFill>
-                <a:srgbClr val="363636"/>
-              </a:solidFill>
-            </a:endParaRPr>
+              <a:t>he sort built-in method</a:t>
+            </a:r>
           </a:p>
           <a:p>
             <a:pPr>
@@ -4238,7 +4404,7 @@
           </a:ln>
           <a:extLst>
             <a:ext uri="{C572A759-6A51-4108-AA02-DFA0A04FC94B}">
-              <ma14:wrappingTextBoxFlag xmlns:ma14="http://schemas.microsoft.com/office/mac/drawingml/2011/main" val="1"/>
+              <ma14:wrappingTextBoxFlag xmlns:ma14="http://schemas.microsoft.com/office/mac/drawingml/2011/main" xmlns:a14="http://schemas.microsoft.com/office/drawing/2010/main" xmlns:m="http://schemas.openxmlformats.org/officeDocument/2006/math" xmlns="" val="1"/>
             </a:ext>
           </a:extLst>
         </p:spPr>
@@ -4345,6 +4511,7 @@
                 <a:sym typeface="Helvetica"/>
               </a:defRPr>
             </a:pPr>
+            <a:endParaRPr/>
           </a:p>
           <a:p>
             <a:pPr marL="432152" indent="-432152" algn="l">
@@ -4400,6 +4567,7 @@
                 <a:sym typeface="Helvetica"/>
               </a:defRPr>
             </a:pPr>
+            <a:endParaRPr/>
           </a:p>
           <a:p>
             <a:pPr algn="l">
@@ -4421,12 +4589,12 @@
   <p:clrMapOvr>
     <a:masterClrMapping/>
   </p:clrMapOvr>
-  <p:transition xmlns:p14="http://schemas.microsoft.com/office/powerpoint/2010/main" spd="med" advClick="1"/>
+  <p:transition spd="med"/>
 </p:sld>
 </file>
 
 <file path=ppt/slides/slide4.xml><?xml version="1.0" encoding="utf-8"?>
-<p:sld xmlns:a="http://schemas.openxmlformats.org/drawingml/2006/main" xmlns:r="http://schemas.openxmlformats.org/officeDocument/2006/relationships" xmlns:p="http://schemas.openxmlformats.org/presentationml/2006/main" xmlns:m="http://schemas.openxmlformats.org/officeDocument/2006/math" xmlns:a14="http://schemas.microsoft.com/office/drawing/2010/main" showMasterSp="1" showMasterPhAnim="1">
+<p:sld xmlns:a="http://schemas.openxmlformats.org/drawingml/2006/main" xmlns:r="http://schemas.openxmlformats.org/officeDocument/2006/relationships" xmlns:p="http://schemas.openxmlformats.org/presentationml/2006/main">
   <p:cSld>
     <p:spTree>
       <p:nvGrpSpPr>
@@ -4461,7 +4629,7 @@
           </a:ln>
           <a:extLst>
             <a:ext uri="{C572A759-6A51-4108-AA02-DFA0A04FC94B}">
-              <ma14:wrappingTextBoxFlag xmlns:ma14="http://schemas.microsoft.com/office/mac/drawingml/2011/main" val="1"/>
+              <ma14:wrappingTextBoxFlag xmlns:ma14="http://schemas.microsoft.com/office/mac/drawingml/2011/main" xmlns:a14="http://schemas.microsoft.com/office/drawing/2010/main" xmlns:m="http://schemas.openxmlformats.org/officeDocument/2006/math" xmlns="" val="1"/>
             </a:ext>
           </a:extLst>
         </p:spPr>
@@ -4520,7 +4688,7 @@
           </a:ln>
           <a:extLst>
             <a:ext uri="{C572A759-6A51-4108-AA02-DFA0A04FC94B}">
-              <ma14:wrappingTextBoxFlag xmlns:ma14="http://schemas.microsoft.com/office/mac/drawingml/2011/main" val="1"/>
+              <ma14:wrappingTextBoxFlag xmlns:ma14="http://schemas.microsoft.com/office/mac/drawingml/2011/main" xmlns:a14="http://schemas.microsoft.com/office/drawing/2010/main" xmlns:m="http://schemas.openxmlformats.org/officeDocument/2006/math" xmlns="" val="1"/>
             </a:ext>
           </a:extLst>
         </p:spPr>
@@ -4571,6 +4739,7 @@
                 <a:sym typeface="Helvetica"/>
               </a:defRPr>
             </a:pPr>
+            <a:endParaRPr/>
           </a:p>
           <a:p>
             <a:pPr defTabSz="457200">
@@ -4604,6 +4773,7 @@
                 <a:sym typeface="Helvetica"/>
               </a:defRPr>
             </a:pPr>
+            <a:endParaRPr/>
           </a:p>
           <a:p>
             <a:pPr defTabSz="457200">
@@ -4628,11 +4798,11 @@
               <a:t> (variables), and </a:t>
             </a:r>
             <a:r>
-              <a:rPr b="1" sz="3600"/>
+              <a:rPr sz="3600" b="1"/>
               <a:t>arguments</a:t>
             </a:r>
             <a:r>
-              <a:rPr i="1" sz="3600"/>
+              <a:rPr sz="3600" i="1"/>
               <a:t> </a:t>
             </a:r>
             <a:r>
@@ -4671,12 +4841,12 @@
   <p:clrMapOvr>
     <a:masterClrMapping/>
   </p:clrMapOvr>
-  <p:transition xmlns:p14="http://schemas.microsoft.com/office/powerpoint/2010/main" spd="med" advClick="1"/>
+  <p:transition spd="med"/>
 </p:sld>
 </file>
 
 <file path=ppt/slides/slide5.xml><?xml version="1.0" encoding="utf-8"?>
-<p:sld xmlns:a="http://schemas.openxmlformats.org/drawingml/2006/main" xmlns:r="http://schemas.openxmlformats.org/officeDocument/2006/relationships" xmlns:p="http://schemas.openxmlformats.org/presentationml/2006/main" xmlns:m="http://schemas.openxmlformats.org/officeDocument/2006/math" xmlns:a14="http://schemas.microsoft.com/office/drawing/2010/main" showMasterSp="1" showMasterPhAnim="1">
+<p:sld xmlns:a="http://schemas.openxmlformats.org/drawingml/2006/main" xmlns:r="http://schemas.openxmlformats.org/officeDocument/2006/relationships" xmlns:p="http://schemas.openxmlformats.org/presentationml/2006/main">
   <p:cSld>
     <p:spTree>
       <p:nvGrpSpPr>
@@ -4711,7 +4881,7 @@
           </a:ln>
           <a:extLst>
             <a:ext uri="{C572A759-6A51-4108-AA02-DFA0A04FC94B}">
-              <ma14:wrappingTextBoxFlag xmlns:ma14="http://schemas.microsoft.com/office/mac/drawingml/2011/main" val="1"/>
+              <ma14:wrappingTextBoxFlag xmlns:ma14="http://schemas.microsoft.com/office/mac/drawingml/2011/main" xmlns:a14="http://schemas.microsoft.com/office/drawing/2010/main" xmlns:m="http://schemas.openxmlformats.org/officeDocument/2006/math" xmlns="" val="1"/>
             </a:ext>
           </a:extLst>
         </p:spPr>
@@ -4742,6 +4912,7 @@
                 <a:sym typeface="Helvetica"/>
               </a:defRPr>
             </a:pPr>
+            <a:endParaRPr/>
           </a:p>
           <a:p>
             <a:pPr defTabSz="457200">
@@ -4774,7 +4945,7 @@
               <a:spcBef>
                 <a:spcPts val="500"/>
               </a:spcBef>
-              <a:defRPr b="1" sz="3500">
+              <a:defRPr sz="3500" b="1">
                 <a:solidFill>
                   <a:schemeClr val="accent5">
                     <a:hueOff val="-444211"/>
@@ -4788,6 +4959,7 @@
                 <a:sym typeface="Helvetica"/>
               </a:defRPr>
             </a:pPr>
+            <a:endParaRPr/>
           </a:p>
           <a:p>
             <a:pPr defTabSz="457200">
@@ -4817,6 +4989,7 @@
                 <a:sym typeface="Helvetica"/>
               </a:defRPr>
             </a:pPr>
+            <a:endParaRPr/>
           </a:p>
           <a:p>
             <a:pPr defTabSz="457200">
@@ -4830,6 +5003,7 @@
                 <a:sym typeface="Helvetica"/>
               </a:defRPr>
             </a:pPr>
+            <a:endParaRPr/>
           </a:p>
         </p:txBody>
       </p:sp>
@@ -4852,7 +5026,7 @@
           </a:ln>
           <a:extLst>
             <a:ext uri="{C572A759-6A51-4108-AA02-DFA0A04FC94B}">
-              <ma14:wrappingTextBoxFlag xmlns:ma14="http://schemas.microsoft.com/office/mac/drawingml/2011/main" val="1"/>
+              <ma14:wrappingTextBoxFlag xmlns:ma14="http://schemas.microsoft.com/office/mac/drawingml/2011/main" xmlns:a14="http://schemas.microsoft.com/office/drawing/2010/main" xmlns:m="http://schemas.openxmlformats.org/officeDocument/2006/math" xmlns="" val="1"/>
             </a:ext>
           </a:extLst>
         </p:spPr>
@@ -4897,12 +5071,12 @@
   <p:clrMapOvr>
     <a:masterClrMapping/>
   </p:clrMapOvr>
-  <p:transition xmlns:p14="http://schemas.microsoft.com/office/powerpoint/2010/main" spd="med" advClick="1"/>
+  <p:transition spd="med"/>
 </p:sld>
 </file>
 
 <file path=ppt/slides/slide6.xml><?xml version="1.0" encoding="utf-8"?>
-<p:sld xmlns:a="http://schemas.openxmlformats.org/drawingml/2006/main" xmlns:r="http://schemas.openxmlformats.org/officeDocument/2006/relationships" xmlns:p="http://schemas.openxmlformats.org/presentationml/2006/main" xmlns:m="http://schemas.openxmlformats.org/officeDocument/2006/math" xmlns:a14="http://schemas.microsoft.com/office/drawing/2010/main" showMasterSp="1" showMasterPhAnim="1">
+<p:sld xmlns:a="http://schemas.openxmlformats.org/drawingml/2006/main" xmlns:r="http://schemas.openxmlformats.org/officeDocument/2006/relationships" xmlns:p="http://schemas.openxmlformats.org/presentationml/2006/main">
   <p:cSld>
     <p:spTree>
       <p:nvGrpSpPr>
@@ -4937,7 +5111,7 @@
           </a:ln>
           <a:extLst>
             <a:ext uri="{C572A759-6A51-4108-AA02-DFA0A04FC94B}">
-              <ma14:wrappingTextBoxFlag xmlns:ma14="http://schemas.microsoft.com/office/mac/drawingml/2011/main" val="1"/>
+              <ma14:wrappingTextBoxFlag xmlns:ma14="http://schemas.microsoft.com/office/mac/drawingml/2011/main" xmlns:a14="http://schemas.microsoft.com/office/drawing/2010/main" xmlns:m="http://schemas.openxmlformats.org/officeDocument/2006/math" xmlns="" val="1"/>
             </a:ext>
           </a:extLst>
         </p:spPr>
@@ -4996,7 +5170,7 @@
           </a:ln>
           <a:extLst>
             <a:ext uri="{C572A759-6A51-4108-AA02-DFA0A04FC94B}">
-              <ma14:wrappingTextBoxFlag xmlns:ma14="http://schemas.microsoft.com/office/mac/drawingml/2011/main" val="1"/>
+              <ma14:wrappingTextBoxFlag xmlns:ma14="http://schemas.microsoft.com/office/mac/drawingml/2011/main" xmlns:a14="http://schemas.microsoft.com/office/drawing/2010/main" xmlns:m="http://schemas.openxmlformats.org/officeDocument/2006/math" xmlns="" val="1"/>
             </a:ext>
           </a:extLst>
         </p:spPr>
@@ -5086,7 +5260,7 @@
           </a:ln>
           <a:extLst>
             <a:ext uri="{C572A759-6A51-4108-AA02-DFA0A04FC94B}">
-              <ma14:wrappingTextBoxFlag xmlns:ma14="http://schemas.microsoft.com/office/mac/drawingml/2011/main" val="1"/>
+              <ma14:wrappingTextBoxFlag xmlns:ma14="http://schemas.microsoft.com/office/mac/drawingml/2011/main" xmlns:a14="http://schemas.microsoft.com/office/drawing/2010/main" xmlns:m="http://schemas.openxmlformats.org/officeDocument/2006/math" xmlns="" val="1"/>
             </a:ext>
           </a:extLst>
         </p:spPr>
@@ -5123,6 +5297,7 @@
                 <a:sym typeface="Helvetica"/>
               </a:defRPr>
             </a:pPr>
+            <a:endParaRPr/>
           </a:p>
           <a:p>
             <a:pPr algn="l" defTabSz="457200">
@@ -5211,11 +5386,6 @@
               </a:rPr>
               <a:t> the method takes</a:t>
             </a:r>
-            <a:endParaRPr>
-              <a:solidFill>
-                <a:srgbClr val="363636"/>
-              </a:solidFill>
-            </a:endParaRPr>
           </a:p>
           <a:p>
             <a:pPr algn="l" defTabSz="457200">
@@ -5232,6 +5402,11 @@
                 <a:sym typeface="Helvetica"/>
               </a:defRPr>
             </a:pPr>
+            <a:endParaRPr>
+              <a:solidFill>
+                <a:srgbClr val="363636"/>
+              </a:solidFill>
+            </a:endParaRPr>
           </a:p>
           <a:p>
             <a:pPr algn="l" defTabSz="457200">
@@ -5275,11 +5450,6 @@
               </a:rPr>
               <a:t>includes the lines of code which determine the procedures the method carries out</a:t>
             </a:r>
-            <a:endParaRPr>
-              <a:solidFill>
-                <a:srgbClr val="363636"/>
-              </a:solidFill>
-            </a:endParaRPr>
           </a:p>
           <a:p>
             <a:pPr algn="l" defTabSz="457200">
@@ -5296,6 +5466,11 @@
                 <a:sym typeface="Helvetica"/>
               </a:defRPr>
             </a:pPr>
+            <a:endParaRPr>
+              <a:solidFill>
+                <a:srgbClr val="363636"/>
+              </a:solidFill>
+            </a:endParaRPr>
           </a:p>
           <a:p>
             <a:pPr algn="l" defTabSz="457200">
@@ -5374,7 +5549,7 @@
           </a:ln>
           <a:extLst>
             <a:ext uri="{C572A759-6A51-4108-AA02-DFA0A04FC94B}">
-              <ma14:wrappingTextBoxFlag xmlns:ma14="http://schemas.microsoft.com/office/mac/drawingml/2011/main" val="1"/>
+              <ma14:wrappingTextBoxFlag xmlns:ma14="http://schemas.microsoft.com/office/mac/drawingml/2011/main" xmlns:a14="http://schemas.microsoft.com/office/drawing/2010/main" xmlns:m="http://schemas.openxmlformats.org/officeDocument/2006/math" xmlns="" val="1"/>
             </a:ext>
           </a:extLst>
         </p:spPr>
@@ -5450,12 +5625,12 @@
   <p:clrMapOvr>
     <a:masterClrMapping/>
   </p:clrMapOvr>
-  <p:transition xmlns:p14="http://schemas.microsoft.com/office/powerpoint/2010/main" spd="med" advClick="1"/>
+  <p:transition spd="med"/>
 </p:sld>
 </file>
 
 <file path=ppt/slides/slide7.xml><?xml version="1.0" encoding="utf-8"?>
-<p:sld xmlns:a="http://schemas.openxmlformats.org/drawingml/2006/main" xmlns:r="http://schemas.openxmlformats.org/officeDocument/2006/relationships" xmlns:p="http://schemas.openxmlformats.org/presentationml/2006/main" xmlns:m="http://schemas.openxmlformats.org/officeDocument/2006/math" xmlns:a14="http://schemas.microsoft.com/office/drawing/2010/main" showMasterSp="1" showMasterPhAnim="1">
+<p:sld xmlns:a="http://schemas.openxmlformats.org/drawingml/2006/main" xmlns:r="http://schemas.openxmlformats.org/officeDocument/2006/relationships" xmlns:p="http://schemas.openxmlformats.org/presentationml/2006/main">
   <p:cSld>
     <p:spTree>
       <p:nvGrpSpPr>
@@ -5490,7 +5665,7 @@
           </a:ln>
           <a:extLst>
             <a:ext uri="{C572A759-6A51-4108-AA02-DFA0A04FC94B}">
-              <ma14:wrappingTextBoxFlag xmlns:ma14="http://schemas.microsoft.com/office/mac/drawingml/2011/main" val="1"/>
+              <ma14:wrappingTextBoxFlag xmlns:ma14="http://schemas.microsoft.com/office/mac/drawingml/2011/main" xmlns:a14="http://schemas.microsoft.com/office/drawing/2010/main" xmlns:m="http://schemas.openxmlformats.org/officeDocument/2006/math" xmlns="" val="1"/>
             </a:ext>
           </a:extLst>
         </p:spPr>
@@ -5549,7 +5724,7 @@
           </a:ln>
           <a:extLst>
             <a:ext uri="{C572A759-6A51-4108-AA02-DFA0A04FC94B}">
-              <ma14:wrappingTextBoxFlag xmlns:ma14="http://schemas.microsoft.com/office/mac/drawingml/2011/main" val="1"/>
+              <ma14:wrappingTextBoxFlag xmlns:ma14="http://schemas.microsoft.com/office/mac/drawingml/2011/main" xmlns:a14="http://schemas.microsoft.com/office/drawing/2010/main" xmlns:m="http://schemas.openxmlformats.org/officeDocument/2006/math" xmlns="" val="1"/>
             </a:ext>
           </a:extLst>
         </p:spPr>
@@ -5609,7 +5784,7 @@
           </a:ln>
           <a:extLst>
             <a:ext uri="{C572A759-6A51-4108-AA02-DFA0A04FC94B}">
-              <ma14:wrappingTextBoxFlag xmlns:ma14="http://schemas.microsoft.com/office/mac/drawingml/2011/main" val="1"/>
+              <ma14:wrappingTextBoxFlag xmlns:ma14="http://schemas.microsoft.com/office/mac/drawingml/2011/main" xmlns:a14="http://schemas.microsoft.com/office/drawing/2010/main" xmlns:m="http://schemas.openxmlformats.org/officeDocument/2006/math" xmlns="" val="1"/>
             </a:ext>
           </a:extLst>
         </p:spPr>
@@ -5712,6 +5887,7 @@
                 <a:sym typeface="Consolas"/>
               </a:defRPr>
             </a:pPr>
+            <a:endParaRPr/>
           </a:p>
           <a:p>
             <a:pPr algn="l">
@@ -5806,6 +5982,7 @@
                 <a:sym typeface="Helvetica Light"/>
               </a:defRPr>
             </a:pPr>
+            <a:endParaRPr/>
           </a:p>
         </p:txBody>
       </p:sp>
@@ -5828,7 +6005,7 @@
           </a:ln>
           <a:extLst>
             <a:ext uri="{C572A759-6A51-4108-AA02-DFA0A04FC94B}">
-              <ma14:wrappingTextBoxFlag xmlns:ma14="http://schemas.microsoft.com/office/mac/drawingml/2011/main" val="1"/>
+              <ma14:wrappingTextBoxFlag xmlns:ma14="http://schemas.microsoft.com/office/mac/drawingml/2011/main" xmlns:a14="http://schemas.microsoft.com/office/drawing/2010/main" xmlns:m="http://schemas.openxmlformats.org/officeDocument/2006/math" xmlns="" val="1"/>
             </a:ext>
           </a:extLst>
         </p:spPr>
@@ -5846,6 +6023,7 @@
               </a:defRPr>
             </a:pPr>
             <a:r>
+              <a:rPr dirty="0"/>
               <a:t>parameters</a:t>
             </a:r>
           </a:p>
@@ -5862,13 +6040,14 @@
               </a:defRPr>
             </a:pPr>
             <a:r>
-              <a:t>the placeholder(s) we put put between the method’s parentheses when we </a:t>
-            </a:r>
-            <a:r>
-              <a:rPr b="1"/>
+              <a:rPr dirty="0"/>
+              <a:t>the placeholder(s) we put between the method’s parentheses when we </a:t>
+            </a:r>
+            <a:r>
+              <a:rPr b="1" dirty="0"/>
               <a:t>define it</a:t>
             </a:r>
-            <a:endParaRPr>
+            <a:endParaRPr dirty="0">
               <a:solidFill>
                 <a:srgbClr val="FF2600"/>
               </a:solidFill>
@@ -5879,6 +6058,7 @@
               <a:defRPr sz="1900"/>
             </a:pPr>
             <a:r>
+              <a:rPr dirty="0"/>
               <a:t> </a:t>
             </a:r>
           </a:p>
@@ -5921,6 +6101,7 @@
                 <a:sym typeface="Helvetica Light"/>
               </a:defRPr>
             </a:pPr>
+            <a:endParaRPr/>
           </a:p>
         </p:txBody>
       </p:sp>
@@ -5943,7 +6124,7 @@
           </a:ln>
           <a:extLst>
             <a:ext uri="{C572A759-6A51-4108-AA02-DFA0A04FC94B}">
-              <ma14:wrappingTextBoxFlag xmlns:ma14="http://schemas.microsoft.com/office/mac/drawingml/2011/main" val="1"/>
+              <ma14:wrappingTextBoxFlag xmlns:ma14="http://schemas.microsoft.com/office/mac/drawingml/2011/main" xmlns:a14="http://schemas.microsoft.com/office/drawing/2010/main" xmlns:m="http://schemas.openxmlformats.org/officeDocument/2006/math" xmlns="" val="1"/>
             </a:ext>
           </a:extLst>
         </p:spPr>
@@ -5973,10 +6154,7 @@
               <a:defRPr sz="1900"/>
             </a:pPr>
             <a:r>
-              <a:t>the values we put between the method’s parentheses when we </a:t>
-            </a:r>
-            <a:r>
-              <a:t>call it  </a:t>
+              <a:t>the values we put between the method’s parentheses when we call it  </a:t>
             </a:r>
           </a:p>
         </p:txBody>
@@ -5986,12 +6164,12 @@
   <p:clrMapOvr>
     <a:masterClrMapping/>
   </p:clrMapOvr>
-  <p:transition xmlns:p14="http://schemas.microsoft.com/office/powerpoint/2010/main" spd="med" advClick="1"/>
+  <p:transition spd="med"/>
 </p:sld>
 </file>
 
 <file path=ppt/slides/slide8.xml><?xml version="1.0" encoding="utf-8"?>
-<p:sld xmlns:a="http://schemas.openxmlformats.org/drawingml/2006/main" xmlns:r="http://schemas.openxmlformats.org/officeDocument/2006/relationships" xmlns:p="http://schemas.openxmlformats.org/presentationml/2006/main" xmlns:m="http://schemas.openxmlformats.org/officeDocument/2006/math" xmlns:a14="http://schemas.microsoft.com/office/drawing/2010/main" showMasterSp="1" showMasterPhAnim="1">
+<p:sld xmlns:a="http://schemas.openxmlformats.org/drawingml/2006/main" xmlns:r="http://schemas.openxmlformats.org/officeDocument/2006/relationships" xmlns:p="http://schemas.openxmlformats.org/presentationml/2006/main">
   <p:cSld>
     <p:spTree>
       <p:nvGrpSpPr>
@@ -6026,7 +6204,7 @@
           </a:ln>
           <a:extLst>
             <a:ext uri="{C572A759-6A51-4108-AA02-DFA0A04FC94B}">
-              <ma14:wrappingTextBoxFlag xmlns:ma14="http://schemas.microsoft.com/office/mac/drawingml/2011/main" val="1"/>
+              <ma14:wrappingTextBoxFlag xmlns:ma14="http://schemas.microsoft.com/office/mac/drawingml/2011/main" xmlns:a14="http://schemas.microsoft.com/office/drawing/2010/main" xmlns:m="http://schemas.openxmlformats.org/officeDocument/2006/math" xmlns="" val="1"/>
             </a:ext>
           </a:extLst>
         </p:spPr>
@@ -6111,6 +6289,7 @@
                 <a:sym typeface="Consolas"/>
               </a:defRPr>
             </a:pPr>
+            <a:endParaRPr/>
           </a:p>
           <a:p>
             <a:pPr algn="l">
@@ -6217,7 +6396,7 @@
           </a:ln>
           <a:extLst>
             <a:ext uri="{C572A759-6A51-4108-AA02-DFA0A04FC94B}">
-              <ma14:wrappingTextBoxFlag xmlns:ma14="http://schemas.microsoft.com/office/mac/drawingml/2011/main" val="1"/>
+              <ma14:wrappingTextBoxFlag xmlns:ma14="http://schemas.microsoft.com/office/mac/drawingml/2011/main" xmlns:a14="http://schemas.microsoft.com/office/drawing/2010/main" xmlns:m="http://schemas.openxmlformats.org/officeDocument/2006/math" xmlns="" val="1"/>
             </a:ext>
           </a:extLst>
         </p:spPr>
@@ -6276,7 +6455,7 @@
           </a:ln>
           <a:extLst>
             <a:ext uri="{C572A759-6A51-4108-AA02-DFA0A04FC94B}">
-              <ma14:wrappingTextBoxFlag xmlns:ma14="http://schemas.microsoft.com/office/mac/drawingml/2011/main" val="1"/>
+              <ma14:wrappingTextBoxFlag xmlns:ma14="http://schemas.microsoft.com/office/mac/drawingml/2011/main" xmlns:a14="http://schemas.microsoft.com/office/drawing/2010/main" xmlns:m="http://schemas.openxmlformats.org/officeDocument/2006/math" xmlns="" val="1"/>
             </a:ext>
           </a:extLst>
         </p:spPr>
@@ -6324,6 +6503,7 @@
                 <a:sym typeface="Helvetica"/>
               </a:defRPr>
             </a:pPr>
+            <a:endParaRPr/>
           </a:p>
           <a:p>
             <a:pPr algn="l" defTabSz="457200">
@@ -6387,6 +6567,7 @@
                 <a:sym typeface="Helvetica Light"/>
               </a:defRPr>
             </a:pPr>
+            <a:endParaRPr/>
           </a:p>
         </p:txBody>
       </p:sp>
@@ -6409,7 +6590,7 @@
           </a:ln>
           <a:extLst>
             <a:ext uri="{C572A759-6A51-4108-AA02-DFA0A04FC94B}">
-              <ma14:wrappingTextBoxFlag xmlns:ma14="http://schemas.microsoft.com/office/mac/drawingml/2011/main" val="1"/>
+              <ma14:wrappingTextBoxFlag xmlns:ma14="http://schemas.microsoft.com/office/mac/drawingml/2011/main" xmlns:a14="http://schemas.microsoft.com/office/drawing/2010/main" xmlns:m="http://schemas.openxmlformats.org/officeDocument/2006/math" xmlns="" val="1"/>
             </a:ext>
           </a:extLst>
         </p:spPr>
@@ -6423,7 +6604,6 @@
             </a:lvl1pPr>
           </a:lstStyle>
           <a:p>
-            <a:pPr/>
             <a:r>
               <a:t>not printing, just giving us back the result</a:t>
             </a:r>
@@ -6435,12 +6615,12 @@
   <p:clrMapOvr>
     <a:masterClrMapping/>
   </p:clrMapOvr>
-  <p:transition xmlns:p14="http://schemas.microsoft.com/office/powerpoint/2010/main" spd="med" advClick="1"/>
+  <p:transition spd="med"/>
 </p:sld>
 </file>
 
 <file path=ppt/slides/slide9.xml><?xml version="1.0" encoding="utf-8"?>
-<p:sld xmlns:a="http://schemas.openxmlformats.org/drawingml/2006/main" xmlns:r="http://schemas.openxmlformats.org/officeDocument/2006/relationships" xmlns:p="http://schemas.openxmlformats.org/presentationml/2006/main" xmlns:m="http://schemas.openxmlformats.org/officeDocument/2006/math" xmlns:a14="http://schemas.microsoft.com/office/drawing/2010/main" showMasterSp="1" showMasterPhAnim="1">
+<p:sld xmlns:a="http://schemas.openxmlformats.org/drawingml/2006/main" xmlns:r="http://schemas.openxmlformats.org/officeDocument/2006/relationships" xmlns:p="http://schemas.openxmlformats.org/presentationml/2006/main">
   <p:cSld>
     <p:spTree>
       <p:nvGrpSpPr>
@@ -6475,7 +6655,7 @@
           </a:ln>
           <a:extLst>
             <a:ext uri="{C572A759-6A51-4108-AA02-DFA0A04FC94B}">
-              <ma14:wrappingTextBoxFlag xmlns:ma14="http://schemas.microsoft.com/office/mac/drawingml/2011/main" val="1"/>
+              <ma14:wrappingTextBoxFlag xmlns:ma14="http://schemas.microsoft.com/office/mac/drawingml/2011/main" xmlns:a14="http://schemas.microsoft.com/office/drawing/2010/main" xmlns:m="http://schemas.openxmlformats.org/officeDocument/2006/math" xmlns="" val="1"/>
             </a:ext>
           </a:extLst>
         </p:spPr>
@@ -6534,7 +6714,7 @@
           </a:ln>
           <a:extLst>
             <a:ext uri="{C572A759-6A51-4108-AA02-DFA0A04FC94B}">
-              <ma14:wrappingTextBoxFlag xmlns:ma14="http://schemas.microsoft.com/office/mac/drawingml/2011/main" val="1"/>
+              <ma14:wrappingTextBoxFlag xmlns:ma14="http://schemas.microsoft.com/office/mac/drawingml/2011/main" xmlns:a14="http://schemas.microsoft.com/office/drawing/2010/main" xmlns:m="http://schemas.openxmlformats.org/officeDocument/2006/math" xmlns="" val="1"/>
             </a:ext>
           </a:extLst>
         </p:spPr>
@@ -6588,17 +6768,29 @@
         </p:nvGraphicFramePr>
         <p:xfrm>
           <a:off x="292100" y="3882082"/>
-          <a:ext cx="13012738" cy="5685136"/>
+          <a:ext cx="13004800" cy="5672435"/>
         </p:xfrm>
-        <a:graphic xmlns:a="http://schemas.openxmlformats.org/drawingml/2006/main">
+        <a:graphic>
           <a:graphicData uri="http://schemas.openxmlformats.org/drawingml/2006/table">
             <a:tbl>
-              <a:tblPr firstCol="0" firstRow="0" lastCol="0" lastRow="0" bandCol="0" bandRow="0" rtl="0">
+              <a:tblPr>
                 <a:tableStyleId>{C7B018BB-80A7-4F77-B60F-C8B233D01FF8}</a:tableStyleId>
               </a:tblPr>
               <a:tblGrid>
-                <a:gridCol w="6732564"/>
-                <a:gridCol w="6272236"/>
+                <a:gridCol w="6732564">
+                  <a:extLst>
+                    <a:ext uri="{9D8B030D-6E8A-4147-A177-3AD203B41FA5}">
+                      <a16:colId xmlns:a16="http://schemas.microsoft.com/office/drawing/2014/main" val="20000"/>
+                    </a:ext>
+                  </a:extLst>
+                </a:gridCol>
+                <a:gridCol w="6272236">
+                  <a:extLst>
+                    <a:ext uri="{9D8B030D-6E8A-4147-A177-3AD203B41FA5}">
+                      <a16:colId xmlns:a16="http://schemas.microsoft.com/office/drawing/2014/main" val="20001"/>
+                    </a:ext>
+                  </a:extLst>
+                </a:gridCol>
               </a:tblGrid>
               <a:tr h="5672435">
                 <a:tc>
@@ -6617,6 +6809,7 @@
                           <a:sym typeface="Helvetica Neue"/>
                         </a:defRPr>
                       </a:pPr>
+                      <a:endParaRPr/>
                     </a:p>
                     <a:p>
                       <a:pPr algn="l" defTabSz="457200">
@@ -6630,6 +6823,7 @@
                           <a:sym typeface="Helvetica Neue"/>
                         </a:defRPr>
                       </a:pPr>
+                      <a:endParaRPr/>
                     </a:p>
                     <a:p>
                       <a:pPr algn="l" defTabSz="457200">
@@ -6743,6 +6937,7 @@
                           <a:sym typeface="Helvetica"/>
                         </a:defRPr>
                       </a:pPr>
+                      <a:endParaRPr/>
                     </a:p>
                     <a:p>
                       <a:pPr algn="l" defTabSz="457200">
@@ -6776,6 +6971,7 @@
                           <a:sym typeface="Helvetica"/>
                         </a:defRPr>
                       </a:pPr>
+                      <a:endParaRPr/>
                     </a:p>
                     <a:p>
                       <a:pPr algn="l" defTabSz="457200">
@@ -6874,7 +7070,7 @@
                       </a:r>
                     </a:p>
                   </a:txBody>
-                  <a:tcPr marL="50800" marR="50800" marT="50800" marB="50800" anchor="ctr" anchorCtr="0" horzOverflow="overflow">
+                  <a:tcPr marL="50800" marR="50800" marT="50800" marB="50800" anchor="ctr" horzOverflow="overflow">
                     <a:lnL w="3175">
                       <a:solidFill>
                         <a:srgbClr val="FFFFFF"/>
@@ -6924,6 +7120,7 @@
                           <a:sym typeface="Consolas"/>
                         </a:defRPr>
                       </a:pPr>
+                      <a:endParaRPr/>
                     </a:p>
                     <a:p>
                       <a:pPr algn="l" defTabSz="457200">
@@ -7041,6 +7238,7 @@
                           <a:sym typeface="Consolas"/>
                         </a:defRPr>
                       </a:pPr>
+                      <a:endParaRPr/>
                     </a:p>
                     <a:p>
                       <a:pPr algn="l" defTabSz="457200">
@@ -7078,6 +7276,7 @@
                           <a:sym typeface="Consolas"/>
                         </a:defRPr>
                       </a:pPr>
+                      <a:endParaRPr/>
                     </a:p>
                     <a:p>
                       <a:pPr algn="l" defTabSz="457200">
@@ -7136,7 +7335,7 @@
                       </a:r>
                     </a:p>
                   </a:txBody>
-                  <a:tcPr marL="50800" marR="50800" marT="50800" marB="50800" anchor="ctr" anchorCtr="0" horzOverflow="overflow">
+                  <a:tcPr marL="50800" marR="50800" marT="50800" marB="50800" anchor="ctr" horzOverflow="overflow">
                     <a:lnL w="12700">
                       <a:solidFill>
                         <a:srgbClr val="FFFFFF"/>
@@ -7166,6 +7365,11 @@
                     </a:solidFill>
                   </a:tcPr>
                 </a:tc>
+                <a:extLst>
+                  <a:ext uri="{0D108BD9-81ED-4DB2-BD59-A6C34878D82A}">
+                    <a16:rowId xmlns:a16="http://schemas.microsoft.com/office/drawing/2014/main" val="10000"/>
+                  </a:ext>
+                </a:extLst>
               </a:tr>
             </a:tbl>
           </a:graphicData>
@@ -7190,7 +7394,7 @@
           </a:ln>
           <a:extLst>
             <a:ext uri="{C572A759-6A51-4108-AA02-DFA0A04FC94B}">
-              <ma14:wrappingTextBoxFlag xmlns:ma14="http://schemas.microsoft.com/office/mac/drawingml/2011/main" val="1"/>
+              <ma14:wrappingTextBoxFlag xmlns:ma14="http://schemas.microsoft.com/office/mac/drawingml/2011/main" xmlns:a14="http://schemas.microsoft.com/office/drawing/2010/main" xmlns:m="http://schemas.openxmlformats.org/officeDocument/2006/math" xmlns="" val="1"/>
             </a:ext>
           </a:extLst>
         </p:spPr>
@@ -7204,7 +7408,6 @@
             </a:lvl1pPr>
           </a:lstStyle>
           <a:p>
-            <a:pPr/>
             <a:r>
               <a:t>vs.</a:t>
             </a:r>
@@ -7230,7 +7433,7 @@
           </a:ln>
           <a:extLst>
             <a:ext uri="{C572A759-6A51-4108-AA02-DFA0A04FC94B}">
-              <ma14:wrappingTextBoxFlag xmlns:ma14="http://schemas.microsoft.com/office/mac/drawingml/2011/main" val="1"/>
+              <ma14:wrappingTextBoxFlag xmlns:ma14="http://schemas.microsoft.com/office/mac/drawingml/2011/main" xmlns:a14="http://schemas.microsoft.com/office/drawing/2010/main" xmlns:m="http://schemas.openxmlformats.org/officeDocument/2006/math" xmlns="" val="1"/>
             </a:ext>
           </a:extLst>
         </p:spPr>
@@ -7244,7 +7447,6 @@
             </a:lvl1pPr>
           </a:lstStyle>
           <a:p>
-            <a:pPr/>
             <a:r>
               <a:t>a parameter with the splat operator allows the method to expect one or more arguments</a:t>
             </a:r>
@@ -7288,6 +7490,7 @@
                 <a:sym typeface="Helvetica Light"/>
               </a:defRPr>
             </a:pPr>
+            <a:endParaRPr/>
           </a:p>
         </p:txBody>
       </p:sp>
@@ -7322,7 +7525,7 @@
             </a:cxnLst>
             <a:rect l="0" t="0" r="r" b="b"/>
             <a:pathLst>
-              <a:path w="21452" h="20404" fill="norm" stroke="1" extrusionOk="0">
+              <a:path w="21452" h="20404" extrusionOk="0">
                 <a:moveTo>
                   <a:pt x="19340" y="6"/>
                 </a:moveTo>
@@ -7442,7 +7645,7 @@
             <a:miter lim="400000"/>
           </a:ln>
           <a:effectLst>
-            <a:outerShdw sx="100000" sy="100000" kx="0" ky="0" algn="b" rotWithShape="0" blurRad="25400" dist="12700" dir="5400000">
+            <a:outerShdw blurRad="25400" dist="12700" dir="5400000" rotWithShape="0">
               <a:srgbClr val="000000">
                 <a:alpha val="50000"/>
               </a:srgbClr>
@@ -7464,6 +7667,7 @@
                 <a:sym typeface="Helvetica Light"/>
               </a:defRPr>
             </a:pPr>
+            <a:endParaRPr/>
           </a:p>
         </p:txBody>
       </p:sp>
@@ -7498,7 +7702,7 @@
             </a:cxnLst>
             <a:rect l="0" t="0" r="r" b="b"/>
             <a:pathLst>
-              <a:path w="21484" h="21548" fill="norm" stroke="1" extrusionOk="0">
+              <a:path w="21484" h="21548" extrusionOk="0">
                 <a:moveTo>
                   <a:pt x="18655" y="0"/>
                 </a:moveTo>
@@ -7748,7 +7952,7 @@
             <a:miter lim="400000"/>
           </a:ln>
           <a:effectLst>
-            <a:outerShdw sx="100000" sy="100000" kx="0" ky="0" algn="b" rotWithShape="0" blurRad="25400" dist="12700" dir="5400000">
+            <a:outerShdw blurRad="25400" dist="12700" dir="5400000" rotWithShape="0">
               <a:srgbClr val="000000">
                 <a:alpha val="50000"/>
               </a:srgbClr>
@@ -7770,6 +7974,7 @@
                 <a:sym typeface="Helvetica Light"/>
               </a:defRPr>
             </a:pPr>
+            <a:endParaRPr/>
           </a:p>
         </p:txBody>
       </p:sp>
@@ -7778,12 +7983,12 @@
   <p:clrMapOvr>
     <a:masterClrMapping/>
   </p:clrMapOvr>
-  <p:transition xmlns:p14="http://schemas.microsoft.com/office/powerpoint/2010/main" spd="med" advClick="1"/>
+  <p:transition spd="med"/>
 </p:sld>
 </file>
 
 <file path=ppt/theme/theme1.xml><?xml version="1.0" encoding="utf-8"?>
-<a:theme xmlns:a="http://schemas.openxmlformats.org/drawingml/2006/main" xmlns:r="http://schemas.openxmlformats.org/officeDocument/2006/relationships" name="White">
+<a:theme xmlns:a="http://schemas.openxmlformats.org/drawingml/2006/main" name="White">
   <a:themeElements>
     <a:clrScheme name="White">
       <a:dk1>
@@ -7909,7 +8114,7 @@
       <a:effectStyleLst>
         <a:effectStyle>
           <a:effectLst>
-            <a:outerShdw sx="100000" sy="100000" kx="0" ky="0" algn="b" rotWithShape="0" blurRad="25400" dist="12700" dir="5400000">
+            <a:outerShdw blurRad="25400" dist="12700" dir="5400000" rotWithShape="0">
               <a:srgbClr val="000000">
                 <a:alpha val="50000"/>
               </a:srgbClr>
@@ -7918,7 +8123,7 @@
         </a:effectStyle>
         <a:effectStyle>
           <a:effectLst>
-            <a:outerShdw sx="100000" sy="100000" kx="0" ky="0" algn="b" rotWithShape="0" blurRad="25400" dist="0" dir="0">
+            <a:outerShdw blurRad="25400" rotWithShape="0">
               <a:srgbClr val="000000">
                 <a:alpha val="50000"/>
               </a:srgbClr>
@@ -7927,7 +8132,7 @@
         </a:effectStyle>
         <a:effectStyle>
           <a:effectLst>
-            <a:outerShdw sx="100000" sy="100000" kx="0" ky="0" algn="b" rotWithShape="0" blurRad="25400" dist="12700" dir="5400000">
+            <a:outerShdw blurRad="25400" dist="12700" dir="5400000" rotWithShape="0">
               <a:srgbClr val="000000">
                 <a:alpha val="50000"/>
               </a:srgbClr>
@@ -7991,8 +8196,8 @@
     <a:spDef>
       <a:spPr>
         <a:blipFill rotWithShape="1">
-          <a:blip r:embed="rId1"/>
-          <a:srcRect l="0" t="0" r="0" b="0"/>
+          <a:blip xmlns:r="http://schemas.openxmlformats.org/officeDocument/2006/relationships" r:embed="rId1"/>
+          <a:srcRect/>
           <a:tile tx="0" ty="0" sx="100000" sy="100000" flip="none" algn="tl"/>
         </a:blipFill>
         <a:ln w="3175" cap="flat">
@@ -8000,7 +8205,7 @@
           <a:miter lim="400000"/>
         </a:ln>
         <a:effectLst>
-          <a:outerShdw sx="100000" sy="100000" kx="0" ky="0" algn="b" rotWithShape="0" blurRad="25400" dist="12700" dir="5400000">
+          <a:outerShdw blurRad="25400" dist="12700" dir="5400000" rotWithShape="0">
             <a:srgbClr val="000000">
               <a:alpha val="50000"/>
             </a:srgbClr>
@@ -8008,7 +8213,7 @@
         </a:effectLst>
         <a:sp3d/>
       </a:spPr>
-      <a:bodyPr rot="0" spcFirstLastPara="1" vertOverflow="overflow" horzOverflow="overflow" vert="horz" wrap="square" lIns="38100" tIns="38100" rIns="38100" bIns="38100" numCol="1" spcCol="38100" rtlCol="0" anchor="ctr" upright="0">
+      <a:bodyPr rot="0" spcFirstLastPara="1" vertOverflow="overflow" horzOverflow="overflow" vert="horz" wrap="square" lIns="38100" tIns="38100" rIns="38100" bIns="38100" numCol="1" spcCol="38100" rtlCol="0" anchor="ctr">
         <a:spAutoFit/>
       </a:bodyPr>
       <a:lstStyle>
@@ -8027,7 +8232,7 @@
           <a:buFontTx/>
           <a:buNone/>
           <a:tabLst/>
-          <a:defRPr b="0" baseline="0" cap="none" i="0" spc="0" strike="noStrike" sz="2200" u="none" kumimoji="0" normalizeH="0">
+          <a:defRPr kumimoji="0" sz="2200" b="0" i="0" u="none" strike="noStrike" cap="none" spc="0" normalizeH="0" baseline="0">
             <a:ln>
               <a:noFill/>
             </a:ln>
@@ -8057,7 +8262,7 @@
           <a:buFontTx/>
           <a:buNone/>
           <a:tabLst/>
-          <a:defRPr b="0" baseline="0" cap="none" i="0" spc="0" strike="noStrike" sz="1800" u="none" kumimoji="0" normalizeH="0">
+          <a:defRPr kumimoji="0" sz="1800" b="0" i="0" u="none" strike="noStrike" cap="none" spc="0" normalizeH="0" baseline="0">
             <a:ln>
               <a:noFill/>
             </a:ln>
@@ -8083,7 +8288,7 @@
           <a:buFontTx/>
           <a:buNone/>
           <a:tabLst/>
-          <a:defRPr b="0" baseline="0" cap="none" i="0" spc="0" strike="noStrike" sz="1800" u="none" kumimoji="0" normalizeH="0">
+          <a:defRPr kumimoji="0" sz="1800" b="0" i="0" u="none" strike="noStrike" cap="none" spc="0" normalizeH="0" baseline="0">
             <a:ln>
               <a:noFill/>
             </a:ln>
@@ -8109,7 +8314,7 @@
           <a:buFontTx/>
           <a:buNone/>
           <a:tabLst/>
-          <a:defRPr b="0" baseline="0" cap="none" i="0" spc="0" strike="noStrike" sz="1800" u="none" kumimoji="0" normalizeH="0">
+          <a:defRPr kumimoji="0" sz="1800" b="0" i="0" u="none" strike="noStrike" cap="none" spc="0" normalizeH="0" baseline="0">
             <a:ln>
               <a:noFill/>
             </a:ln>
@@ -8135,7 +8340,7 @@
           <a:buFontTx/>
           <a:buNone/>
           <a:tabLst/>
-          <a:defRPr b="0" baseline="0" cap="none" i="0" spc="0" strike="noStrike" sz="1800" u="none" kumimoji="0" normalizeH="0">
+          <a:defRPr kumimoji="0" sz="1800" b="0" i="0" u="none" strike="noStrike" cap="none" spc="0" normalizeH="0" baseline="0">
             <a:ln>
               <a:noFill/>
             </a:ln>
@@ -8161,7 +8366,7 @@
           <a:buFontTx/>
           <a:buNone/>
           <a:tabLst/>
-          <a:defRPr b="0" baseline="0" cap="none" i="0" spc="0" strike="noStrike" sz="1800" u="none" kumimoji="0" normalizeH="0">
+          <a:defRPr kumimoji="0" sz="1800" b="0" i="0" u="none" strike="noStrike" cap="none" spc="0" normalizeH="0" baseline="0">
             <a:ln>
               <a:noFill/>
             </a:ln>
@@ -8187,7 +8392,7 @@
           <a:buFontTx/>
           <a:buNone/>
           <a:tabLst/>
-          <a:defRPr b="0" baseline="0" cap="none" i="0" spc="0" strike="noStrike" sz="1800" u="none" kumimoji="0" normalizeH="0">
+          <a:defRPr kumimoji="0" sz="1800" b="0" i="0" u="none" strike="noStrike" cap="none" spc="0" normalizeH="0" baseline="0">
             <a:ln>
               <a:noFill/>
             </a:ln>
@@ -8213,7 +8418,7 @@
           <a:buFontTx/>
           <a:buNone/>
           <a:tabLst/>
-          <a:defRPr b="0" baseline="0" cap="none" i="0" spc="0" strike="noStrike" sz="1800" u="none" kumimoji="0" normalizeH="0">
+          <a:defRPr kumimoji="0" sz="1800" b="0" i="0" u="none" strike="noStrike" cap="none" spc="0" normalizeH="0" baseline="0">
             <a:ln>
               <a:noFill/>
             </a:ln>
@@ -8239,7 +8444,7 @@
           <a:buFontTx/>
           <a:buNone/>
           <a:tabLst/>
-          <a:defRPr b="0" baseline="0" cap="none" i="0" spc="0" strike="noStrike" sz="1800" u="none" kumimoji="0" normalizeH="0">
+          <a:defRPr kumimoji="0" sz="1800" b="0" i="0" u="none" strike="noStrike" cap="none" spc="0" normalizeH="0" baseline="0">
             <a:ln>
               <a:noFill/>
             </a:ln>
@@ -8265,7 +8470,7 @@
           <a:buFontTx/>
           <a:buNone/>
           <a:tabLst/>
-          <a:defRPr b="0" baseline="0" cap="none" i="0" spc="0" strike="noStrike" sz="1800" u="none" kumimoji="0" normalizeH="0">
+          <a:defRPr kumimoji="0" sz="1800" b="0" i="0" u="none" strike="noStrike" cap="none" spc="0" normalizeH="0" baseline="0">
             <a:ln>
               <a:noFill/>
             </a:ln>
@@ -8278,9 +8483,15 @@
         </a:lvl9pPr>
       </a:lstStyle>
       <a:style>
-        <a:lnRef idx="0"/>
-        <a:fillRef idx="0"/>
-        <a:effectRef idx="0"/>
+        <a:lnRef idx="0">
+          <a:scrgbClr r="0" g="0" b="0"/>
+        </a:lnRef>
+        <a:fillRef idx="0">
+          <a:scrgbClr r="0" g="0" b="0"/>
+        </a:fillRef>
+        <a:effectRef idx="0">
+          <a:scrgbClr r="0" g="0" b="0"/>
+        </a:effectRef>
         <a:fontRef idx="none"/>
       </a:style>
     </a:spDef>
@@ -8297,7 +8508,7 @@
         <a:effectLst/>
         <a:sp3d/>
       </a:spPr>
-      <a:bodyPr rot="0" spcFirstLastPara="1" vertOverflow="overflow" horzOverflow="overflow" vert="horz" wrap="square" lIns="91439" tIns="45719" rIns="91439" bIns="45719" numCol="1" spcCol="38100" rtlCol="0" anchor="t" upright="0">
+      <a:bodyPr rot="0" spcFirstLastPara="1" vertOverflow="overflow" horzOverflow="overflow" vert="horz" wrap="square" lIns="91439" tIns="45719" rIns="91439" bIns="45719" numCol="1" spcCol="38100" rtlCol="0" anchor="t">
         <a:noAutofit/>
       </a:bodyPr>
       <a:lstStyle>
@@ -8316,7 +8527,7 @@
           <a:buFontTx/>
           <a:buNone/>
           <a:tabLst/>
-          <a:defRPr b="0" baseline="0" cap="none" i="0" spc="0" strike="noStrike" sz="1800" u="none" kumimoji="0" normalizeH="0">
+          <a:defRPr kumimoji="0" sz="1800" b="0" i="0" u="none" strike="noStrike" cap="none" spc="0" normalizeH="0" baseline="0">
             <a:ln>
               <a:noFill/>
             </a:ln>
@@ -8342,7 +8553,7 @@
           <a:buFontTx/>
           <a:buNone/>
           <a:tabLst/>
-          <a:defRPr b="0" baseline="0" cap="none" i="0" spc="0" strike="noStrike" sz="1800" u="none" kumimoji="0" normalizeH="0">
+          <a:defRPr kumimoji="0" sz="1800" b="0" i="0" u="none" strike="noStrike" cap="none" spc="0" normalizeH="0" baseline="0">
             <a:ln>
               <a:noFill/>
             </a:ln>
@@ -8368,7 +8579,7 @@
           <a:buFontTx/>
           <a:buNone/>
           <a:tabLst/>
-          <a:defRPr b="0" baseline="0" cap="none" i="0" spc="0" strike="noStrike" sz="1800" u="none" kumimoji="0" normalizeH="0">
+          <a:defRPr kumimoji="0" sz="1800" b="0" i="0" u="none" strike="noStrike" cap="none" spc="0" normalizeH="0" baseline="0">
             <a:ln>
               <a:noFill/>
             </a:ln>
@@ -8394,7 +8605,7 @@
           <a:buFontTx/>
           <a:buNone/>
           <a:tabLst/>
-          <a:defRPr b="0" baseline="0" cap="none" i="0" spc="0" strike="noStrike" sz="1800" u="none" kumimoji="0" normalizeH="0">
+          <a:defRPr kumimoji="0" sz="1800" b="0" i="0" u="none" strike="noStrike" cap="none" spc="0" normalizeH="0" baseline="0">
             <a:ln>
               <a:noFill/>
             </a:ln>
@@ -8420,7 +8631,7 @@
           <a:buFontTx/>
           <a:buNone/>
           <a:tabLst/>
-          <a:defRPr b="0" baseline="0" cap="none" i="0" spc="0" strike="noStrike" sz="1800" u="none" kumimoji="0" normalizeH="0">
+          <a:defRPr kumimoji="0" sz="1800" b="0" i="0" u="none" strike="noStrike" cap="none" spc="0" normalizeH="0" baseline="0">
             <a:ln>
               <a:noFill/>
             </a:ln>
@@ -8446,7 +8657,7 @@
           <a:buFontTx/>
           <a:buNone/>
           <a:tabLst/>
-          <a:defRPr b="0" baseline="0" cap="none" i="0" spc="0" strike="noStrike" sz="1800" u="none" kumimoji="0" normalizeH="0">
+          <a:defRPr kumimoji="0" sz="1800" b="0" i="0" u="none" strike="noStrike" cap="none" spc="0" normalizeH="0" baseline="0">
             <a:ln>
               <a:noFill/>
             </a:ln>
@@ -8472,7 +8683,7 @@
           <a:buFontTx/>
           <a:buNone/>
           <a:tabLst/>
-          <a:defRPr b="0" baseline="0" cap="none" i="0" spc="0" strike="noStrike" sz="1800" u="none" kumimoji="0" normalizeH="0">
+          <a:defRPr kumimoji="0" sz="1800" b="0" i="0" u="none" strike="noStrike" cap="none" spc="0" normalizeH="0" baseline="0">
             <a:ln>
               <a:noFill/>
             </a:ln>
@@ -8498,7 +8709,7 @@
           <a:buFontTx/>
           <a:buNone/>
           <a:tabLst/>
-          <a:defRPr b="0" baseline="0" cap="none" i="0" spc="0" strike="noStrike" sz="1800" u="none" kumimoji="0" normalizeH="0">
+          <a:defRPr kumimoji="0" sz="1800" b="0" i="0" u="none" strike="noStrike" cap="none" spc="0" normalizeH="0" baseline="0">
             <a:ln>
               <a:noFill/>
             </a:ln>
@@ -8524,7 +8735,7 @@
           <a:buFontTx/>
           <a:buNone/>
           <a:tabLst/>
-          <a:defRPr b="0" baseline="0" cap="none" i="0" spc="0" strike="noStrike" sz="1800" u="none" kumimoji="0" normalizeH="0">
+          <a:defRPr kumimoji="0" sz="1800" b="0" i="0" u="none" strike="noStrike" cap="none" spc="0" normalizeH="0" baseline="0">
             <a:ln>
               <a:noFill/>
             </a:ln>
@@ -8550,7 +8761,7 @@
           <a:buFontTx/>
           <a:buNone/>
           <a:tabLst/>
-          <a:defRPr b="0" baseline="0" cap="none" i="0" spc="0" strike="noStrike" sz="1800" u="none" kumimoji="0" normalizeH="0">
+          <a:defRPr kumimoji="0" sz="1800" b="0" i="0" u="none" strike="noStrike" cap="none" spc="0" normalizeH="0" baseline="0">
             <a:ln>
               <a:noFill/>
             </a:ln>
@@ -8563,9 +8774,15 @@
         </a:lvl9pPr>
       </a:lstStyle>
       <a:style>
-        <a:lnRef idx="0"/>
-        <a:fillRef idx="0"/>
-        <a:effectRef idx="0"/>
+        <a:lnRef idx="0">
+          <a:scrgbClr r="0" g="0" b="0"/>
+        </a:lnRef>
+        <a:fillRef idx="0">
+          <a:scrgbClr r="0" g="0" b="0"/>
+        </a:fillRef>
+        <a:effectRef idx="0">
+          <a:scrgbClr r="0" g="0" b="0"/>
+        </a:effectRef>
         <a:fontRef idx="none"/>
       </a:style>
     </a:lnDef>
@@ -8579,7 +8796,7 @@
         <a:effectLst/>
         <a:sp3d/>
       </a:spPr>
-      <a:bodyPr rot="0" spcFirstLastPara="1" vertOverflow="overflow" horzOverflow="overflow" vert="horz" wrap="square" lIns="38100" tIns="38100" rIns="38100" bIns="38100" numCol="1" spcCol="38100" rtlCol="0" anchor="ctr" upright="0">
+      <a:bodyPr rot="0" spcFirstLastPara="1" vertOverflow="overflow" horzOverflow="overflow" vert="horz" wrap="square" lIns="38100" tIns="38100" rIns="38100" bIns="38100" numCol="1" spcCol="38100" rtlCol="0" anchor="ctr">
         <a:spAutoFit/>
       </a:bodyPr>
       <a:lstStyle>
@@ -8598,7 +8815,7 @@
           <a:buFontTx/>
           <a:buNone/>
           <a:tabLst/>
-          <a:defRPr b="0" baseline="0" cap="none" i="0" spc="0" strike="noStrike" sz="5800" u="none" kumimoji="0" normalizeH="0">
+          <a:defRPr kumimoji="0" sz="5800" b="0" i="0" u="none" strike="noStrike" cap="none" spc="0" normalizeH="0" baseline="0">
             <a:ln>
               <a:noFill/>
             </a:ln>
@@ -8628,7 +8845,7 @@
           <a:buFontTx/>
           <a:buNone/>
           <a:tabLst/>
-          <a:defRPr b="0" baseline="0" cap="none" i="0" spc="0" strike="noStrike" sz="1800" u="none" kumimoji="0" normalizeH="0">
+          <a:defRPr kumimoji="0" sz="1800" b="0" i="0" u="none" strike="noStrike" cap="none" spc="0" normalizeH="0" baseline="0">
             <a:ln>
               <a:noFill/>
             </a:ln>
@@ -8654,7 +8871,7 @@
           <a:buFontTx/>
           <a:buNone/>
           <a:tabLst/>
-          <a:defRPr b="0" baseline="0" cap="none" i="0" spc="0" strike="noStrike" sz="1800" u="none" kumimoji="0" normalizeH="0">
+          <a:defRPr kumimoji="0" sz="1800" b="0" i="0" u="none" strike="noStrike" cap="none" spc="0" normalizeH="0" baseline="0">
             <a:ln>
               <a:noFill/>
             </a:ln>
@@ -8680,7 +8897,7 @@
           <a:buFontTx/>
           <a:buNone/>
           <a:tabLst/>
-          <a:defRPr b="0" baseline="0" cap="none" i="0" spc="0" strike="noStrike" sz="1800" u="none" kumimoji="0" normalizeH="0">
+          <a:defRPr kumimoji="0" sz="1800" b="0" i="0" u="none" strike="noStrike" cap="none" spc="0" normalizeH="0" baseline="0">
             <a:ln>
               <a:noFill/>
             </a:ln>
@@ -8706,7 +8923,7 @@
           <a:buFontTx/>
           <a:buNone/>
           <a:tabLst/>
-          <a:defRPr b="0" baseline="0" cap="none" i="0" spc="0" strike="noStrike" sz="1800" u="none" kumimoji="0" normalizeH="0">
+          <a:defRPr kumimoji="0" sz="1800" b="0" i="0" u="none" strike="noStrike" cap="none" spc="0" normalizeH="0" baseline="0">
             <a:ln>
               <a:noFill/>
             </a:ln>
@@ -8732,7 +8949,7 @@
           <a:buFontTx/>
           <a:buNone/>
           <a:tabLst/>
-          <a:defRPr b="0" baseline="0" cap="none" i="0" spc="0" strike="noStrike" sz="1800" u="none" kumimoji="0" normalizeH="0">
+          <a:defRPr kumimoji="0" sz="1800" b="0" i="0" u="none" strike="noStrike" cap="none" spc="0" normalizeH="0" baseline="0">
             <a:ln>
               <a:noFill/>
             </a:ln>
@@ -8758,7 +8975,7 @@
           <a:buFontTx/>
           <a:buNone/>
           <a:tabLst/>
-          <a:defRPr b="0" baseline="0" cap="none" i="0" spc="0" strike="noStrike" sz="1800" u="none" kumimoji="0" normalizeH="0">
+          <a:defRPr kumimoji="0" sz="1800" b="0" i="0" u="none" strike="noStrike" cap="none" spc="0" normalizeH="0" baseline="0">
             <a:ln>
               <a:noFill/>
             </a:ln>
@@ -8784,7 +9001,7 @@
           <a:buFontTx/>
           <a:buNone/>
           <a:tabLst/>
-          <a:defRPr b="0" baseline="0" cap="none" i="0" spc="0" strike="noStrike" sz="1800" u="none" kumimoji="0" normalizeH="0">
+          <a:defRPr kumimoji="0" sz="1800" b="0" i="0" u="none" strike="noStrike" cap="none" spc="0" normalizeH="0" baseline="0">
             <a:ln>
               <a:noFill/>
             </a:ln>
@@ -8810,7 +9027,7 @@
           <a:buFontTx/>
           <a:buNone/>
           <a:tabLst/>
-          <a:defRPr b="0" baseline="0" cap="none" i="0" spc="0" strike="noStrike" sz="1800" u="none" kumimoji="0" normalizeH="0">
+          <a:defRPr kumimoji="0" sz="1800" b="0" i="0" u="none" strike="noStrike" cap="none" spc="0" normalizeH="0" baseline="0">
             <a:ln>
               <a:noFill/>
             </a:ln>
@@ -8836,7 +9053,7 @@
           <a:buFontTx/>
           <a:buNone/>
           <a:tabLst/>
-          <a:defRPr b="0" baseline="0" cap="none" i="0" spc="0" strike="noStrike" sz="1800" u="none" kumimoji="0" normalizeH="0">
+          <a:defRPr kumimoji="0" sz="1800" b="0" i="0" u="none" strike="noStrike" cap="none" spc="0" normalizeH="0" baseline="0">
             <a:ln>
               <a:noFill/>
             </a:ln>
@@ -8849,18 +9066,25 @@
         </a:lvl9pPr>
       </a:lstStyle>
       <a:style>
-        <a:lnRef idx="0"/>
-        <a:fillRef idx="0"/>
-        <a:effectRef idx="0"/>
+        <a:lnRef idx="0">
+          <a:scrgbClr r="0" g="0" b="0"/>
+        </a:lnRef>
+        <a:fillRef idx="0">
+          <a:scrgbClr r="0" g="0" b="0"/>
+        </a:fillRef>
+        <a:effectRef idx="0">
+          <a:scrgbClr r="0" g="0" b="0"/>
+        </a:effectRef>
         <a:fontRef idx="none"/>
       </a:style>
     </a:txDef>
   </a:objectDefaults>
+  <a:extraClrSchemeLst/>
 </a:theme>
 </file>
 
 <file path=ppt/theme/theme2.xml><?xml version="1.0" encoding="utf-8"?>
-<a:theme xmlns:a="http://schemas.openxmlformats.org/drawingml/2006/main" xmlns:r="http://schemas.openxmlformats.org/officeDocument/2006/relationships" name="White">
+<a:theme xmlns:a="http://schemas.openxmlformats.org/drawingml/2006/main" name="White">
   <a:themeElements>
     <a:clrScheme name="White">
       <a:dk1>
@@ -8986,7 +9210,7 @@
       <a:effectStyleLst>
         <a:effectStyle>
           <a:effectLst>
-            <a:outerShdw sx="100000" sy="100000" kx="0" ky="0" algn="b" rotWithShape="0" blurRad="25400" dist="12700" dir="5400000">
+            <a:outerShdw blurRad="25400" dist="12700" dir="5400000" rotWithShape="0">
               <a:srgbClr val="000000">
                 <a:alpha val="50000"/>
               </a:srgbClr>
@@ -8995,7 +9219,7 @@
         </a:effectStyle>
         <a:effectStyle>
           <a:effectLst>
-            <a:outerShdw sx="100000" sy="100000" kx="0" ky="0" algn="b" rotWithShape="0" blurRad="25400" dist="0" dir="0">
+            <a:outerShdw blurRad="25400" rotWithShape="0">
               <a:srgbClr val="000000">
                 <a:alpha val="50000"/>
               </a:srgbClr>
@@ -9004,7 +9228,7 @@
         </a:effectStyle>
         <a:effectStyle>
           <a:effectLst>
-            <a:outerShdw sx="100000" sy="100000" kx="0" ky="0" algn="b" rotWithShape="0" blurRad="25400" dist="12700" dir="5400000">
+            <a:outerShdw blurRad="25400" dist="12700" dir="5400000" rotWithShape="0">
               <a:srgbClr val="000000">
                 <a:alpha val="50000"/>
               </a:srgbClr>
@@ -9068,8 +9292,8 @@
     <a:spDef>
       <a:spPr>
         <a:blipFill rotWithShape="1">
-          <a:blip r:embed="rId1"/>
-          <a:srcRect l="0" t="0" r="0" b="0"/>
+          <a:blip xmlns:r="http://schemas.openxmlformats.org/officeDocument/2006/relationships" r:embed="rId1"/>
+          <a:srcRect/>
           <a:tile tx="0" ty="0" sx="100000" sy="100000" flip="none" algn="tl"/>
         </a:blipFill>
         <a:ln w="3175" cap="flat">
@@ -9077,7 +9301,7 @@
           <a:miter lim="400000"/>
         </a:ln>
         <a:effectLst>
-          <a:outerShdw sx="100000" sy="100000" kx="0" ky="0" algn="b" rotWithShape="0" blurRad="25400" dist="12700" dir="5400000">
+          <a:outerShdw blurRad="25400" dist="12700" dir="5400000" rotWithShape="0">
             <a:srgbClr val="000000">
               <a:alpha val="50000"/>
             </a:srgbClr>
@@ -9085,7 +9309,7 @@
         </a:effectLst>
         <a:sp3d/>
       </a:spPr>
-      <a:bodyPr rot="0" spcFirstLastPara="1" vertOverflow="overflow" horzOverflow="overflow" vert="horz" wrap="square" lIns="38100" tIns="38100" rIns="38100" bIns="38100" numCol="1" spcCol="38100" rtlCol="0" anchor="ctr" upright="0">
+      <a:bodyPr rot="0" spcFirstLastPara="1" vertOverflow="overflow" horzOverflow="overflow" vert="horz" wrap="square" lIns="38100" tIns="38100" rIns="38100" bIns="38100" numCol="1" spcCol="38100" rtlCol="0" anchor="ctr">
         <a:spAutoFit/>
       </a:bodyPr>
       <a:lstStyle>
@@ -9104,7 +9328,7 @@
           <a:buFontTx/>
           <a:buNone/>
           <a:tabLst/>
-          <a:defRPr b="0" baseline="0" cap="none" i="0" spc="0" strike="noStrike" sz="2200" u="none" kumimoji="0" normalizeH="0">
+          <a:defRPr kumimoji="0" sz="2200" b="0" i="0" u="none" strike="noStrike" cap="none" spc="0" normalizeH="0" baseline="0">
             <a:ln>
               <a:noFill/>
             </a:ln>
@@ -9134,7 +9358,7 @@
           <a:buFontTx/>
           <a:buNone/>
           <a:tabLst/>
-          <a:defRPr b="0" baseline="0" cap="none" i="0" spc="0" strike="noStrike" sz="1800" u="none" kumimoji="0" normalizeH="0">
+          <a:defRPr kumimoji="0" sz="1800" b="0" i="0" u="none" strike="noStrike" cap="none" spc="0" normalizeH="0" baseline="0">
             <a:ln>
               <a:noFill/>
             </a:ln>
@@ -9160,7 +9384,7 @@
           <a:buFontTx/>
           <a:buNone/>
           <a:tabLst/>
-          <a:defRPr b="0" baseline="0" cap="none" i="0" spc="0" strike="noStrike" sz="1800" u="none" kumimoji="0" normalizeH="0">
+          <a:defRPr kumimoji="0" sz="1800" b="0" i="0" u="none" strike="noStrike" cap="none" spc="0" normalizeH="0" baseline="0">
             <a:ln>
               <a:noFill/>
             </a:ln>
@@ -9186,7 +9410,7 @@
           <a:buFontTx/>
           <a:buNone/>
           <a:tabLst/>
-          <a:defRPr b="0" baseline="0" cap="none" i="0" spc="0" strike="noStrike" sz="1800" u="none" kumimoji="0" normalizeH="0">
+          <a:defRPr kumimoji="0" sz="1800" b="0" i="0" u="none" strike="noStrike" cap="none" spc="0" normalizeH="0" baseline="0">
             <a:ln>
               <a:noFill/>
             </a:ln>
@@ -9212,7 +9436,7 @@
           <a:buFontTx/>
           <a:buNone/>
           <a:tabLst/>
-          <a:defRPr b="0" baseline="0" cap="none" i="0" spc="0" strike="noStrike" sz="1800" u="none" kumimoji="0" normalizeH="0">
+          <a:defRPr kumimoji="0" sz="1800" b="0" i="0" u="none" strike="noStrike" cap="none" spc="0" normalizeH="0" baseline="0">
             <a:ln>
               <a:noFill/>
             </a:ln>
@@ -9238,7 +9462,7 @@
           <a:buFontTx/>
           <a:buNone/>
           <a:tabLst/>
-          <a:defRPr b="0" baseline="0" cap="none" i="0" spc="0" strike="noStrike" sz="1800" u="none" kumimoji="0" normalizeH="0">
+          <a:defRPr kumimoji="0" sz="1800" b="0" i="0" u="none" strike="noStrike" cap="none" spc="0" normalizeH="0" baseline="0">
             <a:ln>
               <a:noFill/>
             </a:ln>
@@ -9264,7 +9488,7 @@
           <a:buFontTx/>
           <a:buNone/>
           <a:tabLst/>
-          <a:defRPr b="0" baseline="0" cap="none" i="0" spc="0" strike="noStrike" sz="1800" u="none" kumimoji="0" normalizeH="0">
+          <a:defRPr kumimoji="0" sz="1800" b="0" i="0" u="none" strike="noStrike" cap="none" spc="0" normalizeH="0" baseline="0">
             <a:ln>
               <a:noFill/>
             </a:ln>
@@ -9290,7 +9514,7 @@
           <a:buFontTx/>
           <a:buNone/>
           <a:tabLst/>
-          <a:defRPr b="0" baseline="0" cap="none" i="0" spc="0" strike="noStrike" sz="1800" u="none" kumimoji="0" normalizeH="0">
+          <a:defRPr kumimoji="0" sz="1800" b="0" i="0" u="none" strike="noStrike" cap="none" spc="0" normalizeH="0" baseline="0">
             <a:ln>
               <a:noFill/>
             </a:ln>
@@ -9316,7 +9540,7 @@
           <a:buFontTx/>
           <a:buNone/>
           <a:tabLst/>
-          <a:defRPr b="0" baseline="0" cap="none" i="0" spc="0" strike="noStrike" sz="1800" u="none" kumimoji="0" normalizeH="0">
+          <a:defRPr kumimoji="0" sz="1800" b="0" i="0" u="none" strike="noStrike" cap="none" spc="0" normalizeH="0" baseline="0">
             <a:ln>
               <a:noFill/>
             </a:ln>
@@ -9342,7 +9566,7 @@
           <a:buFontTx/>
           <a:buNone/>
           <a:tabLst/>
-          <a:defRPr b="0" baseline="0" cap="none" i="0" spc="0" strike="noStrike" sz="1800" u="none" kumimoji="0" normalizeH="0">
+          <a:defRPr kumimoji="0" sz="1800" b="0" i="0" u="none" strike="noStrike" cap="none" spc="0" normalizeH="0" baseline="0">
             <a:ln>
               <a:noFill/>
             </a:ln>
@@ -9355,9 +9579,15 @@
         </a:lvl9pPr>
       </a:lstStyle>
       <a:style>
-        <a:lnRef idx="0"/>
-        <a:fillRef idx="0"/>
-        <a:effectRef idx="0"/>
+        <a:lnRef idx="0">
+          <a:scrgbClr r="0" g="0" b="0"/>
+        </a:lnRef>
+        <a:fillRef idx="0">
+          <a:scrgbClr r="0" g="0" b="0"/>
+        </a:fillRef>
+        <a:effectRef idx="0">
+          <a:scrgbClr r="0" g="0" b="0"/>
+        </a:effectRef>
         <a:fontRef idx="none"/>
       </a:style>
     </a:spDef>
@@ -9374,7 +9604,7 @@
         <a:effectLst/>
         <a:sp3d/>
       </a:spPr>
-      <a:bodyPr rot="0" spcFirstLastPara="1" vertOverflow="overflow" horzOverflow="overflow" vert="horz" wrap="square" lIns="91439" tIns="45719" rIns="91439" bIns="45719" numCol="1" spcCol="38100" rtlCol="0" anchor="t" upright="0">
+      <a:bodyPr rot="0" spcFirstLastPara="1" vertOverflow="overflow" horzOverflow="overflow" vert="horz" wrap="square" lIns="91439" tIns="45719" rIns="91439" bIns="45719" numCol="1" spcCol="38100" rtlCol="0" anchor="t">
         <a:noAutofit/>
       </a:bodyPr>
       <a:lstStyle>
@@ -9393,7 +9623,7 @@
           <a:buFontTx/>
           <a:buNone/>
           <a:tabLst/>
-          <a:defRPr b="0" baseline="0" cap="none" i="0" spc="0" strike="noStrike" sz="1800" u="none" kumimoji="0" normalizeH="0">
+          <a:defRPr kumimoji="0" sz="1800" b="0" i="0" u="none" strike="noStrike" cap="none" spc="0" normalizeH="0" baseline="0">
             <a:ln>
               <a:noFill/>
             </a:ln>
@@ -9419,7 +9649,7 @@
           <a:buFontTx/>
           <a:buNone/>
           <a:tabLst/>
-          <a:defRPr b="0" baseline="0" cap="none" i="0" spc="0" strike="noStrike" sz="1800" u="none" kumimoji="0" normalizeH="0">
+          <a:defRPr kumimoji="0" sz="1800" b="0" i="0" u="none" strike="noStrike" cap="none" spc="0" normalizeH="0" baseline="0">
             <a:ln>
               <a:noFill/>
             </a:ln>
@@ -9445,7 +9675,7 @@
           <a:buFontTx/>
           <a:buNone/>
           <a:tabLst/>
-          <a:defRPr b="0" baseline="0" cap="none" i="0" spc="0" strike="noStrike" sz="1800" u="none" kumimoji="0" normalizeH="0">
+          <a:defRPr kumimoji="0" sz="1800" b="0" i="0" u="none" strike="noStrike" cap="none" spc="0" normalizeH="0" baseline="0">
             <a:ln>
               <a:noFill/>
             </a:ln>
@@ -9471,7 +9701,7 @@
           <a:buFontTx/>
           <a:buNone/>
           <a:tabLst/>
-          <a:defRPr b="0" baseline="0" cap="none" i="0" spc="0" strike="noStrike" sz="1800" u="none" kumimoji="0" normalizeH="0">
+          <a:defRPr kumimoji="0" sz="1800" b="0" i="0" u="none" strike="noStrike" cap="none" spc="0" normalizeH="0" baseline="0">
             <a:ln>
               <a:noFill/>
             </a:ln>
@@ -9497,7 +9727,7 @@
           <a:buFontTx/>
           <a:buNone/>
           <a:tabLst/>
-          <a:defRPr b="0" baseline="0" cap="none" i="0" spc="0" strike="noStrike" sz="1800" u="none" kumimoji="0" normalizeH="0">
+          <a:defRPr kumimoji="0" sz="1800" b="0" i="0" u="none" strike="noStrike" cap="none" spc="0" normalizeH="0" baseline="0">
             <a:ln>
               <a:noFill/>
             </a:ln>
@@ -9523,7 +9753,7 @@
           <a:buFontTx/>
           <a:buNone/>
           <a:tabLst/>
-          <a:defRPr b="0" baseline="0" cap="none" i="0" spc="0" strike="noStrike" sz="1800" u="none" kumimoji="0" normalizeH="0">
+          <a:defRPr kumimoji="0" sz="1800" b="0" i="0" u="none" strike="noStrike" cap="none" spc="0" normalizeH="0" baseline="0">
             <a:ln>
               <a:noFill/>
             </a:ln>
@@ -9549,7 +9779,7 @@
           <a:buFontTx/>
           <a:buNone/>
           <a:tabLst/>
-          <a:defRPr b="0" baseline="0" cap="none" i="0" spc="0" strike="noStrike" sz="1800" u="none" kumimoji="0" normalizeH="0">
+          <a:defRPr kumimoji="0" sz="1800" b="0" i="0" u="none" strike="noStrike" cap="none" spc="0" normalizeH="0" baseline="0">
             <a:ln>
               <a:noFill/>
             </a:ln>
@@ -9575,7 +9805,7 @@
           <a:buFontTx/>
           <a:buNone/>
           <a:tabLst/>
-          <a:defRPr b="0" baseline="0" cap="none" i="0" spc="0" strike="noStrike" sz="1800" u="none" kumimoji="0" normalizeH="0">
+          <a:defRPr kumimoji="0" sz="1800" b="0" i="0" u="none" strike="noStrike" cap="none" spc="0" normalizeH="0" baseline="0">
             <a:ln>
               <a:noFill/>
             </a:ln>
@@ -9601,7 +9831,7 @@
           <a:buFontTx/>
           <a:buNone/>
           <a:tabLst/>
-          <a:defRPr b="0" baseline="0" cap="none" i="0" spc="0" strike="noStrike" sz="1800" u="none" kumimoji="0" normalizeH="0">
+          <a:defRPr kumimoji="0" sz="1800" b="0" i="0" u="none" strike="noStrike" cap="none" spc="0" normalizeH="0" baseline="0">
             <a:ln>
               <a:noFill/>
             </a:ln>
@@ -9627,7 +9857,7 @@
           <a:buFontTx/>
           <a:buNone/>
           <a:tabLst/>
-          <a:defRPr b="0" baseline="0" cap="none" i="0" spc="0" strike="noStrike" sz="1800" u="none" kumimoji="0" normalizeH="0">
+          <a:defRPr kumimoji="0" sz="1800" b="0" i="0" u="none" strike="noStrike" cap="none" spc="0" normalizeH="0" baseline="0">
             <a:ln>
               <a:noFill/>
             </a:ln>
@@ -9640,9 +9870,15 @@
         </a:lvl9pPr>
       </a:lstStyle>
       <a:style>
-        <a:lnRef idx="0"/>
-        <a:fillRef idx="0"/>
-        <a:effectRef idx="0"/>
+        <a:lnRef idx="0">
+          <a:scrgbClr r="0" g="0" b="0"/>
+        </a:lnRef>
+        <a:fillRef idx="0">
+          <a:scrgbClr r="0" g="0" b="0"/>
+        </a:fillRef>
+        <a:effectRef idx="0">
+          <a:scrgbClr r="0" g="0" b="0"/>
+        </a:effectRef>
         <a:fontRef idx="none"/>
       </a:style>
     </a:lnDef>
@@ -9656,7 +9892,7 @@
         <a:effectLst/>
         <a:sp3d/>
       </a:spPr>
-      <a:bodyPr rot="0" spcFirstLastPara="1" vertOverflow="overflow" horzOverflow="overflow" vert="horz" wrap="square" lIns="38100" tIns="38100" rIns="38100" bIns="38100" numCol="1" spcCol="38100" rtlCol="0" anchor="ctr" upright="0">
+      <a:bodyPr rot="0" spcFirstLastPara="1" vertOverflow="overflow" horzOverflow="overflow" vert="horz" wrap="square" lIns="38100" tIns="38100" rIns="38100" bIns="38100" numCol="1" spcCol="38100" rtlCol="0" anchor="ctr">
         <a:spAutoFit/>
       </a:bodyPr>
       <a:lstStyle>
@@ -9675,7 +9911,7 @@
           <a:buFontTx/>
           <a:buNone/>
           <a:tabLst/>
-          <a:defRPr b="0" baseline="0" cap="none" i="0" spc="0" strike="noStrike" sz="5800" u="none" kumimoji="0" normalizeH="0">
+          <a:defRPr kumimoji="0" sz="5800" b="0" i="0" u="none" strike="noStrike" cap="none" spc="0" normalizeH="0" baseline="0">
             <a:ln>
               <a:noFill/>
             </a:ln>
@@ -9705,7 +9941,7 @@
           <a:buFontTx/>
           <a:buNone/>
           <a:tabLst/>
-          <a:defRPr b="0" baseline="0" cap="none" i="0" spc="0" strike="noStrike" sz="1800" u="none" kumimoji="0" normalizeH="0">
+          <a:defRPr kumimoji="0" sz="1800" b="0" i="0" u="none" strike="noStrike" cap="none" spc="0" normalizeH="0" baseline="0">
             <a:ln>
               <a:noFill/>
             </a:ln>
@@ -9731,7 +9967,7 @@
           <a:buFontTx/>
           <a:buNone/>
           <a:tabLst/>
-          <a:defRPr b="0" baseline="0" cap="none" i="0" spc="0" strike="noStrike" sz="1800" u="none" kumimoji="0" normalizeH="0">
+          <a:defRPr kumimoji="0" sz="1800" b="0" i="0" u="none" strike="noStrike" cap="none" spc="0" normalizeH="0" baseline="0">
             <a:ln>
               <a:noFill/>
             </a:ln>
@@ -9757,7 +9993,7 @@
           <a:buFontTx/>
           <a:buNone/>
           <a:tabLst/>
-          <a:defRPr b="0" baseline="0" cap="none" i="0" spc="0" strike="noStrike" sz="1800" u="none" kumimoji="0" normalizeH="0">
+          <a:defRPr kumimoji="0" sz="1800" b="0" i="0" u="none" strike="noStrike" cap="none" spc="0" normalizeH="0" baseline="0">
             <a:ln>
               <a:noFill/>
             </a:ln>
@@ -9783,7 +10019,7 @@
           <a:buFontTx/>
           <a:buNone/>
           <a:tabLst/>
-          <a:defRPr b="0" baseline="0" cap="none" i="0" spc="0" strike="noStrike" sz="1800" u="none" kumimoji="0" normalizeH="0">
+          <a:defRPr kumimoji="0" sz="1800" b="0" i="0" u="none" strike="noStrike" cap="none" spc="0" normalizeH="0" baseline="0">
             <a:ln>
               <a:noFill/>
             </a:ln>
@@ -9809,7 +10045,7 @@
           <a:buFontTx/>
           <a:buNone/>
           <a:tabLst/>
-          <a:defRPr b="0" baseline="0" cap="none" i="0" spc="0" strike="noStrike" sz="1800" u="none" kumimoji="0" normalizeH="0">
+          <a:defRPr kumimoji="0" sz="1800" b="0" i="0" u="none" strike="noStrike" cap="none" spc="0" normalizeH="0" baseline="0">
             <a:ln>
               <a:noFill/>
             </a:ln>
@@ -9835,7 +10071,7 @@
           <a:buFontTx/>
           <a:buNone/>
           <a:tabLst/>
-          <a:defRPr b="0" baseline="0" cap="none" i="0" spc="0" strike="noStrike" sz="1800" u="none" kumimoji="0" normalizeH="0">
+          <a:defRPr kumimoji="0" sz="1800" b="0" i="0" u="none" strike="noStrike" cap="none" spc="0" normalizeH="0" baseline="0">
             <a:ln>
               <a:noFill/>
             </a:ln>
@@ -9861,7 +10097,7 @@
           <a:buFontTx/>
           <a:buNone/>
           <a:tabLst/>
-          <a:defRPr b="0" baseline="0" cap="none" i="0" spc="0" strike="noStrike" sz="1800" u="none" kumimoji="0" normalizeH="0">
+          <a:defRPr kumimoji="0" sz="1800" b="0" i="0" u="none" strike="noStrike" cap="none" spc="0" normalizeH="0" baseline="0">
             <a:ln>
               <a:noFill/>
             </a:ln>
@@ -9887,7 +10123,7 @@
           <a:buFontTx/>
           <a:buNone/>
           <a:tabLst/>
-          <a:defRPr b="0" baseline="0" cap="none" i="0" spc="0" strike="noStrike" sz="1800" u="none" kumimoji="0" normalizeH="0">
+          <a:defRPr kumimoji="0" sz="1800" b="0" i="0" u="none" strike="noStrike" cap="none" spc="0" normalizeH="0" baseline="0">
             <a:ln>
               <a:noFill/>
             </a:ln>
@@ -9913,7 +10149,7 @@
           <a:buFontTx/>
           <a:buNone/>
           <a:tabLst/>
-          <a:defRPr b="0" baseline="0" cap="none" i="0" spc="0" strike="noStrike" sz="1800" u="none" kumimoji="0" normalizeH="0">
+          <a:defRPr kumimoji="0" sz="1800" b="0" i="0" u="none" strike="noStrike" cap="none" spc="0" normalizeH="0" baseline="0">
             <a:ln>
               <a:noFill/>
             </a:ln>
@@ -9926,12 +10162,19 @@
         </a:lvl9pPr>
       </a:lstStyle>
       <a:style>
-        <a:lnRef idx="0"/>
-        <a:fillRef idx="0"/>
-        <a:effectRef idx="0"/>
+        <a:lnRef idx="0">
+          <a:scrgbClr r="0" g="0" b="0"/>
+        </a:lnRef>
+        <a:fillRef idx="0">
+          <a:scrgbClr r="0" g="0" b="0"/>
+        </a:fillRef>
+        <a:effectRef idx="0">
+          <a:scrgbClr r="0" g="0" b="0"/>
+        </a:effectRef>
         <a:fontRef idx="none"/>
       </a:style>
     </a:txDef>
   </a:objectDefaults>
+  <a:extraClrSchemeLst/>
 </a:theme>
 </file>
</xml_diff>